<commit_message>
Updates suggested by Rob
</commit_message>
<xml_diff>
--- a/Docs/Program_Logging_Tracing.pptx
+++ b/Docs/Program_Logging_Tracing.pptx
@@ -5,29 +5,31 @@
     <p:sldMasterId id="2147483687" r:id="rId1"/>
   </p:sldMasterIdLst>
   <p:notesMasterIdLst>
-    <p:notesMasterId r:id="rId19"/>
+    <p:notesMasterId r:id="rId21"/>
   </p:notesMasterIdLst>
   <p:handoutMasterIdLst>
-    <p:handoutMasterId r:id="rId20"/>
+    <p:handoutMasterId r:id="rId22"/>
   </p:handoutMasterIdLst>
   <p:sldIdLst>
     <p:sldId id="256" r:id="rId2"/>
-    <p:sldId id="257" r:id="rId3"/>
-    <p:sldId id="258" r:id="rId4"/>
-    <p:sldId id="260" r:id="rId5"/>
-    <p:sldId id="273" r:id="rId6"/>
-    <p:sldId id="263" r:id="rId7"/>
-    <p:sldId id="264" r:id="rId8"/>
-    <p:sldId id="261" r:id="rId9"/>
-    <p:sldId id="262" r:id="rId10"/>
-    <p:sldId id="265" r:id="rId11"/>
-    <p:sldId id="266" r:id="rId12"/>
-    <p:sldId id="267" r:id="rId13"/>
-    <p:sldId id="268" r:id="rId14"/>
-    <p:sldId id="269" r:id="rId15"/>
-    <p:sldId id="271" r:id="rId16"/>
-    <p:sldId id="270" r:id="rId17"/>
-    <p:sldId id="272" r:id="rId18"/>
+    <p:sldId id="275" r:id="rId3"/>
+    <p:sldId id="257" r:id="rId4"/>
+    <p:sldId id="258" r:id="rId5"/>
+    <p:sldId id="260" r:id="rId6"/>
+    <p:sldId id="273" r:id="rId7"/>
+    <p:sldId id="263" r:id="rId8"/>
+    <p:sldId id="274" r:id="rId9"/>
+    <p:sldId id="264" r:id="rId10"/>
+    <p:sldId id="261" r:id="rId11"/>
+    <p:sldId id="262" r:id="rId12"/>
+    <p:sldId id="265" r:id="rId13"/>
+    <p:sldId id="266" r:id="rId14"/>
+    <p:sldId id="267" r:id="rId15"/>
+    <p:sldId id="268" r:id="rId16"/>
+    <p:sldId id="269" r:id="rId17"/>
+    <p:sldId id="271" r:id="rId18"/>
+    <p:sldId id="270" r:id="rId19"/>
+    <p:sldId id="272" r:id="rId20"/>
   </p:sldIdLst>
   <p:sldSz cx="12192000" cy="6858000"/>
   <p:notesSz cx="6858000" cy="9144000"/>
@@ -231,7 +233,7 @@
           <a:p>
             <a:fld id="{A7D9A7DC-F1CD-4708-A473-876A4B3B8934}" type="datetime1">
               <a:rPr lang="en-US" smtClean="0"/>
-              <a:t>2/29/2020</a:t>
+              <a:t>3/3/2020</a:t>
             </a:fld>
             <a:endParaRPr lang="en-US" dirty="0"/>
           </a:p>
@@ -415,7 +417,7 @@
           <a:p>
             <a:fld id="{A596092B-28C7-44D1-B902-5437B333DFB7}" type="datetime1">
               <a:rPr lang="en-US" smtClean="0"/>
-              <a:t>2/29/2020</a:t>
+              <a:t>3/3/2020</a:t>
             </a:fld>
             <a:endParaRPr lang="en-US" dirty="0"/>
           </a:p>
@@ -783,7 +785,7 @@
           <a:p>
             <a:fld id="{A596092B-28C7-44D1-B902-5437B333DFB7}" type="datetime1">
               <a:rPr lang="en-US" smtClean="0"/>
-              <a:t>2/29/2020</a:t>
+              <a:t>3/3/2020</a:t>
             </a:fld>
             <a:endParaRPr lang="en-US" dirty="0"/>
           </a:p>
@@ -828,7 +830,7 @@
           <a:p>
             <a:fld id="{BA791329-992B-4F83-8435-C33B0EC26DB3}" type="slidenum">
               <a:rPr lang="en-US" smtClean="0"/>
-              <a:t>7</a:t>
+              <a:t>9</a:t>
             </a:fld>
             <a:endParaRPr lang="en-US" dirty="0"/>
           </a:p>
@@ -934,7 +936,7 @@
           <a:p>
             <a:fld id="{A596092B-28C7-44D1-B902-5437B333DFB7}" type="datetime1">
               <a:rPr lang="en-US" smtClean="0"/>
-              <a:t>2/29/2020</a:t>
+              <a:t>3/3/2020</a:t>
             </a:fld>
             <a:endParaRPr lang="en-US" dirty="0"/>
           </a:p>
@@ -979,7 +981,7 @@
           <a:p>
             <a:fld id="{BA791329-992B-4F83-8435-C33B0EC26DB3}" type="slidenum">
               <a:rPr lang="en-US" smtClean="0"/>
-              <a:t>10</a:t>
+              <a:t>12</a:t>
             </a:fld>
             <a:endParaRPr lang="en-US" dirty="0"/>
           </a:p>
@@ -1095,7 +1097,7 @@
           <a:p>
             <a:fld id="{A596092B-28C7-44D1-B902-5437B333DFB7}" type="datetime1">
               <a:rPr lang="en-US" smtClean="0"/>
-              <a:t>2/29/2020</a:t>
+              <a:t>3/3/2020</a:t>
             </a:fld>
             <a:endParaRPr lang="en-US" dirty="0"/>
           </a:p>
@@ -1140,7 +1142,7 @@
           <a:p>
             <a:fld id="{BA791329-992B-4F83-8435-C33B0EC26DB3}" type="slidenum">
               <a:rPr lang="en-US" smtClean="0"/>
-              <a:t>11</a:t>
+              <a:t>13</a:t>
             </a:fld>
             <a:endParaRPr lang="en-US" dirty="0"/>
           </a:p>
@@ -1249,7 +1251,7 @@
           <a:p>
             <a:fld id="{A596092B-28C7-44D1-B902-5437B333DFB7}" type="datetime1">
               <a:rPr lang="en-US" smtClean="0"/>
-              <a:t>2/29/2020</a:t>
+              <a:t>3/3/2020</a:t>
             </a:fld>
             <a:endParaRPr lang="en-US" dirty="0"/>
           </a:p>
@@ -1294,7 +1296,7 @@
           <a:p>
             <a:fld id="{BA791329-992B-4F83-8435-C33B0EC26DB3}" type="slidenum">
               <a:rPr lang="en-US" smtClean="0"/>
-              <a:t>12</a:t>
+              <a:t>14</a:t>
             </a:fld>
             <a:endParaRPr lang="en-US" dirty="0"/>
           </a:p>
@@ -1403,7 +1405,7 @@
           <a:p>
             <a:fld id="{A596092B-28C7-44D1-B902-5437B333DFB7}" type="datetime1">
               <a:rPr lang="en-US" smtClean="0"/>
-              <a:t>2/29/2020</a:t>
+              <a:t>3/3/2020</a:t>
             </a:fld>
             <a:endParaRPr lang="en-US" dirty="0"/>
           </a:p>
@@ -1448,7 +1450,7 @@
           <a:p>
             <a:fld id="{BA791329-992B-4F83-8435-C33B0EC26DB3}" type="slidenum">
               <a:rPr lang="en-US" smtClean="0"/>
-              <a:t>13</a:t>
+              <a:t>15</a:t>
             </a:fld>
             <a:endParaRPr lang="en-US" dirty="0"/>
           </a:p>
@@ -1554,7 +1556,7 @@
           <a:p>
             <a:fld id="{A596092B-28C7-44D1-B902-5437B333DFB7}" type="datetime1">
               <a:rPr lang="en-US" smtClean="0"/>
-              <a:t>2/29/2020</a:t>
+              <a:t>3/3/2020</a:t>
             </a:fld>
             <a:endParaRPr lang="en-US" dirty="0"/>
           </a:p>
@@ -1599,7 +1601,7 @@
           <a:p>
             <a:fld id="{BA791329-992B-4F83-8435-C33B0EC26DB3}" type="slidenum">
               <a:rPr lang="en-US" smtClean="0"/>
-              <a:t>14</a:t>
+              <a:t>16</a:t>
             </a:fld>
             <a:endParaRPr lang="en-US" dirty="0"/>
           </a:p>
@@ -1705,7 +1707,7 @@
           <a:p>
             <a:fld id="{A596092B-28C7-44D1-B902-5437B333DFB7}" type="datetime1">
               <a:rPr lang="en-US" smtClean="0"/>
-              <a:t>2/29/2020</a:t>
+              <a:t>3/3/2020</a:t>
             </a:fld>
             <a:endParaRPr lang="en-US" dirty="0"/>
           </a:p>
@@ -1750,7 +1752,7 @@
           <a:p>
             <a:fld id="{BA791329-992B-4F83-8435-C33B0EC26DB3}" type="slidenum">
               <a:rPr lang="en-US" smtClean="0"/>
-              <a:t>15</a:t>
+              <a:t>17</a:t>
             </a:fld>
             <a:endParaRPr lang="en-US" dirty="0"/>
           </a:p>
@@ -1856,7 +1858,7 @@
           <a:p>
             <a:fld id="{A596092B-28C7-44D1-B902-5437B333DFB7}" type="datetime1">
               <a:rPr lang="en-US" smtClean="0"/>
-              <a:t>2/29/2020</a:t>
+              <a:t>3/3/2020</a:t>
             </a:fld>
             <a:endParaRPr lang="en-US" dirty="0"/>
           </a:p>
@@ -1901,7 +1903,7 @@
           <a:p>
             <a:fld id="{BA791329-992B-4F83-8435-C33B0EC26DB3}" type="slidenum">
               <a:rPr lang="en-US" smtClean="0"/>
-              <a:t>16</a:t>
+              <a:t>18</a:t>
             </a:fld>
             <a:endParaRPr lang="en-US" dirty="0"/>
           </a:p>
@@ -2007,7 +2009,7 @@
           <a:p>
             <a:fld id="{A596092B-28C7-44D1-B902-5437B333DFB7}" type="datetime1">
               <a:rPr lang="en-US" smtClean="0"/>
-              <a:t>2/29/2020</a:t>
+              <a:t>3/3/2020</a:t>
             </a:fld>
             <a:endParaRPr lang="en-US" dirty="0"/>
           </a:p>
@@ -2052,7 +2054,7 @@
           <a:p>
             <a:fld id="{BA791329-992B-4F83-8435-C33B0EC26DB3}" type="slidenum">
               <a:rPr lang="en-US" smtClean="0"/>
-              <a:t>17</a:t>
+              <a:t>19</a:t>
             </a:fld>
             <a:endParaRPr lang="en-US" dirty="0"/>
           </a:p>
@@ -2793,7 +2795,7 @@
           <a:p>
             <a:fld id="{B1DF5501-EE91-4443-9D3B-24E6F28D34E2}" type="datetime1">
               <a:rPr lang="en-US" smtClean="0"/>
-              <a:t>2/29/2020</a:t>
+              <a:t>3/3/2020</a:t>
             </a:fld>
             <a:endParaRPr lang="en-US" dirty="0"/>
           </a:p>
@@ -3059,7 +3061,7 @@
           <a:p>
             <a:fld id="{E954E1E9-8456-43AD-BA28-861520D256B9}" type="datetime1">
               <a:rPr lang="en-US" smtClean="0"/>
-              <a:t>2/29/2020</a:t>
+              <a:t>3/3/2020</a:t>
             </a:fld>
             <a:endParaRPr lang="en-US" dirty="0"/>
           </a:p>
@@ -3377,7 +3379,7 @@
           <a:p>
             <a:fld id="{FAF31E0C-AAFD-4E63-B3AE-16CD757951F4}" type="datetime1">
               <a:rPr lang="en-US" smtClean="0"/>
-              <a:t>2/29/2020</a:t>
+              <a:t>3/3/2020</a:t>
             </a:fld>
             <a:endParaRPr lang="en-US" dirty="0"/>
           </a:p>
@@ -3722,7 +3724,7 @@
           <a:p>
             <a:fld id="{000084FF-4715-4B6E-BD22-453621E5873F}" type="datetime1">
               <a:rPr lang="en-US" smtClean="0"/>
-              <a:t>2/29/2020</a:t>
+              <a:t>3/3/2020</a:t>
             </a:fld>
             <a:endParaRPr lang="en-US" dirty="0"/>
           </a:p>
@@ -4040,7 +4042,7 @@
           <a:p>
             <a:fld id="{6AC37F8D-4DF5-4AB6-A766-5A84B3D74A3B}" type="datetime1">
               <a:rPr lang="en-US" smtClean="0"/>
-              <a:t>2/29/2020</a:t>
+              <a:t>3/3/2020</a:t>
             </a:fld>
             <a:endParaRPr lang="en-US" dirty="0"/>
           </a:p>
@@ -4437,7 +4439,7 @@
           <a:p>
             <a:fld id="{1BF3CD1A-162D-40B2-9B22-9056F77C27F2}" type="datetime1">
               <a:rPr lang="en-US" smtClean="0"/>
-              <a:t>2/29/2020</a:t>
+              <a:t>3/3/2020</a:t>
             </a:fld>
             <a:endParaRPr lang="en-US" dirty="0"/>
           </a:p>
@@ -4611,7 +4613,7 @@
           <a:p>
             <a:fld id="{D42E4200-B1E5-4E39-8279-05DD69810A37}" type="datetime1">
               <a:rPr lang="en-US" smtClean="0"/>
-              <a:t>2/29/2020</a:t>
+              <a:t>3/3/2020</a:t>
             </a:fld>
             <a:endParaRPr lang="en-US" dirty="0"/>
           </a:p>
@@ -4794,7 +4796,7 @@
           <a:p>
             <a:fld id="{47CF7895-00AC-42E5-9790-7B0E3CE09DF2}" type="datetime1">
               <a:rPr lang="en-US" smtClean="0"/>
-              <a:t>2/29/2020</a:t>
+              <a:t>3/3/2020</a:t>
             </a:fld>
             <a:endParaRPr lang="en-US" dirty="0"/>
           </a:p>
@@ -4973,7 +4975,7 @@
           <a:p>
             <a:fld id="{A7119916-CD40-456D-ABE3-55F8822671F7}" type="datetime1">
               <a:rPr lang="en-US" smtClean="0"/>
-              <a:t>2/29/2020</a:t>
+              <a:t>3/3/2020</a:t>
             </a:fld>
             <a:endParaRPr lang="en-US" dirty="0"/>
           </a:p>
@@ -5223,7 +5225,7 @@
           <a:p>
             <a:fld id="{3F9A13D6-B8C2-463B-B3F7-C62E098B328E}" type="datetime1">
               <a:rPr lang="en-US" smtClean="0"/>
-              <a:t>2/29/2020</a:t>
+              <a:t>3/3/2020</a:t>
             </a:fld>
             <a:endParaRPr lang="en-US" dirty="0"/>
           </a:p>
@@ -5458,7 +5460,7 @@
           <a:p>
             <a:fld id="{D2B63420-31EE-4E4B-911C-2601B14D9FDD}" type="datetime1">
               <a:rPr lang="en-US" smtClean="0"/>
-              <a:t>2/29/2020</a:t>
+              <a:t>3/3/2020</a:t>
             </a:fld>
             <a:endParaRPr lang="en-US" dirty="0"/>
           </a:p>
@@ -5835,7 +5837,7 @@
           <a:p>
             <a:fld id="{2DD8986D-86F8-41E6-8CFF-8C91AEF92622}" type="datetime1">
               <a:rPr lang="en-US" smtClean="0"/>
-              <a:t>2/29/2020</a:t>
+              <a:t>3/3/2020</a:t>
             </a:fld>
             <a:endParaRPr lang="en-US" dirty="0"/>
           </a:p>
@@ -5961,7 +5963,7 @@
           <a:p>
             <a:fld id="{BA885161-032E-4C6A-8EDA-39D168DF18E4}" type="datetime1">
               <a:rPr lang="en-US" smtClean="0"/>
-              <a:t>2/29/2020</a:t>
+              <a:t>3/3/2020</a:t>
             </a:fld>
             <a:endParaRPr lang="en-US" dirty="0"/>
           </a:p>
@@ -6059,7 +6061,7 @@
           <a:p>
             <a:fld id="{958E6740-E523-48D9-9C4E-6F218E87BAF3}" type="datetime1">
               <a:rPr lang="en-US" smtClean="0"/>
-              <a:t>2/29/2020</a:t>
+              <a:t>3/3/2020</a:t>
             </a:fld>
             <a:endParaRPr lang="en-US" dirty="0"/>
           </a:p>
@@ -6317,7 +6319,7 @@
           <a:p>
             <a:fld id="{6121D4CA-FF09-4CB8-8D51-2613D19A0F2E}" type="datetime1">
               <a:rPr lang="en-US" smtClean="0"/>
-              <a:t>2/29/2020</a:t>
+              <a:t>3/3/2020</a:t>
             </a:fld>
             <a:endParaRPr lang="en-US" dirty="0"/>
           </a:p>
@@ -6582,7 +6584,7 @@
           <a:p>
             <a:fld id="{8C4779EA-AEA7-43B3-9B65-A77E9A890421}" type="datetime1">
               <a:rPr lang="en-US" smtClean="0"/>
-              <a:t>2/29/2020</a:t>
+              <a:t>3/3/2020</a:t>
             </a:fld>
             <a:endParaRPr lang="en-US" dirty="0"/>
           </a:p>
@@ -7328,7 +7330,7 @@
           <a:p>
             <a:fld id="{059A67F1-3EA0-4026-BE6A-31EE4E1B1DB5}" type="datetime1">
               <a:rPr lang="en-US" smtClean="0"/>
-              <a:t>2/29/2020</a:t>
+              <a:t>3/3/2020</a:t>
             </a:fld>
             <a:endParaRPr lang="en-US" dirty="0"/>
           </a:p>
@@ -7909,7 +7911,7 @@
           <a:p>
             <a:fld id="{0F09E55C-CECE-4F47-839C-0667B2307420}" type="datetime1">
               <a:rPr lang="en-US" smtClean="0"/>
-              <a:t>2/29/2020</a:t>
+              <a:t>3/3/2020</a:t>
             </a:fld>
             <a:endParaRPr lang="en-US" dirty="0"/>
           </a:p>
@@ -8032,26 +8034,36 @@
         </p:nvSpPr>
         <p:spPr/>
         <p:txBody>
-          <a:bodyPr>
-            <a:normAutofit fontScale="90000"/>
-          </a:bodyPr>
+          <a:bodyPr/>
           <a:lstStyle/>
           <a:p>
             <a:r>
               <a:rPr lang="en-US" dirty="0"/>
-              <a:t>TraceControlWindow</a:t>
+              <a:t>Logging – Example</a:t>
             </a:r>
             <a:br>
               <a:rPr lang="en-US" dirty="0"/>
             </a:br>
             <a:r>
               <a:rPr lang="en-US" dirty="0"/>
-              <a:t>- Window with selectable flag options</a:t>
-            </a:r>
-            <a:br>
-              <a:rPr lang="en-US" dirty="0"/>
-            </a:br>
-            <a:endParaRPr lang="en-US" sz="2800" dirty="0"/>
+              <a:t> </a:t>
+            </a:r>
+            <a:r>
+              <a:rPr lang="en-US" dirty="0">
+                <a:solidFill>
+                  <a:srgbClr val="00B0F0"/>
+                </a:solidFill>
+              </a:rPr>
+              <a:t>- </a:t>
+            </a:r>
+            <a:r>
+              <a:rPr lang="en-US" sz="2800" dirty="0">
+                <a:solidFill>
+                  <a:srgbClr val="00B0F0"/>
+                </a:solidFill>
+              </a:rPr>
+              <a:t>GitHub raysmith619/resource_lib </a:t>
+            </a:r>
           </a:p>
         </p:txBody>
       </p:sp>
@@ -8073,8 +8085,8 @@
         </p:nvSpPr>
         <p:spPr>
           <a:xfrm>
-            <a:off x="677334" y="2160589"/>
-            <a:ext cx="9291856" cy="3880773"/>
+            <a:off x="677333" y="2160589"/>
+            <a:ext cx="9786420" cy="3880773"/>
           </a:xfrm>
         </p:spPr>
         <p:txBody>
@@ -8083,124 +8095,86 @@
           </a:bodyPr>
           <a:lstStyle/>
           <a:p>
-            <a:r>
-              <a:rPr lang="en-US" sz="3600" dirty="0"/>
-              <a:t>Only two setup lines!:</a:t>
-            </a:r>
-          </a:p>
-          <a:p>
-            <a:pPr marL="400050" lvl="1" indent="0" hangingPunct="0">
-              <a:spcBef>
-                <a:spcPts val="0"/>
-              </a:spcBef>
+            <a:pPr marL="400050" lvl="1" indent="0">
               <a:buNone/>
             </a:pPr>
             <a:r>
-              <a:rPr lang="en-US" sz="3400" dirty="0">
+              <a:rPr lang="en-US" sz="2800" dirty="0">
+                <a:latin typeface="Courier New" panose="02070309020205020404" pitchFamily="49" charset="0"/>
+                <a:cs typeface="Courier New" panose="02070309020205020404" pitchFamily="49" charset="0"/>
+              </a:rPr>
+              <a:t># logging_absolute_minimum.py</a:t>
+            </a:r>
+          </a:p>
+          <a:p>
+            <a:pPr marL="400050" lvl="1" indent="0">
+              <a:buNone/>
+            </a:pPr>
+            <a:r>
+              <a:rPr lang="en-US" sz="2800" dirty="0">
                 <a:solidFill>
-                  <a:srgbClr val="0000FF"/>
+                  <a:schemeClr val="accent4"/>
                 </a:solidFill>
                 <a:latin typeface="Courier New" panose="02070309020205020404" pitchFamily="49" charset="0"/>
-                <a:ea typeface="Times New Roman" panose="02020603050405020304" pitchFamily="18" charset="0"/>
-                <a:cs typeface="Times New Roman" panose="02020603050405020304" pitchFamily="18" charset="0"/>
+                <a:cs typeface="Courier New" panose="02070309020205020404" pitchFamily="49" charset="0"/>
               </a:rPr>
               <a:t>from</a:t>
             </a:r>
             <a:r>
-              <a:rPr lang="en-US" sz="3400" dirty="0">
+              <a:rPr lang="en-US" sz="2800" dirty="0">
+                <a:latin typeface="Courier New" panose="02070309020205020404" pitchFamily="49" charset="0"/>
+                <a:cs typeface="Courier New" panose="02070309020205020404" pitchFamily="49" charset="0"/>
+              </a:rPr>
+              <a:t> select_trace </a:t>
+            </a:r>
+            <a:r>
+              <a:rPr lang="en-US" sz="2800" dirty="0">
                 <a:solidFill>
-                  <a:srgbClr val="000000"/>
+                  <a:schemeClr val="accent4"/>
                 </a:solidFill>
                 <a:latin typeface="Courier New" panose="02070309020205020404" pitchFamily="49" charset="0"/>
-                <a:ea typeface="Times New Roman" panose="02020603050405020304" pitchFamily="18" charset="0"/>
-                <a:cs typeface="Times New Roman" panose="02020603050405020304" pitchFamily="18" charset="0"/>
+                <a:cs typeface="Courier New" panose="02070309020205020404" pitchFamily="49" charset="0"/>
               </a:rPr>
-              <a:t> select_trace </a:t>
-            </a:r>
-            <a:r>
-              <a:rPr lang="en-US" sz="3400" dirty="0">
+              <a:t>import</a:t>
+            </a:r>
+            <a:r>
+              <a:rPr lang="en-US" sz="2800" dirty="0">
+                <a:latin typeface="Courier New" panose="02070309020205020404" pitchFamily="49" charset="0"/>
+                <a:cs typeface="Courier New" panose="02070309020205020404" pitchFamily="49" charset="0"/>
+              </a:rPr>
+              <a:t> SlTrace</a:t>
+            </a:r>
+          </a:p>
+          <a:p>
+            <a:pPr marL="400050" lvl="1" indent="0">
+              <a:buNone/>
+            </a:pPr>
+            <a:endParaRPr lang="en-US" sz="3400" dirty="0">
+              <a:latin typeface="Courier New" panose="02070309020205020404" pitchFamily="49" charset="0"/>
+              <a:cs typeface="Courier New" panose="02070309020205020404" pitchFamily="49" charset="0"/>
+            </a:endParaRPr>
+          </a:p>
+          <a:p>
+            <a:pPr marL="400050" lvl="1" indent="0">
+              <a:buNone/>
+            </a:pPr>
+            <a:r>
+              <a:rPr lang="en-US" sz="2800" dirty="0">
+                <a:latin typeface="Courier New" panose="02070309020205020404" pitchFamily="49" charset="0"/>
+                <a:cs typeface="Courier New" panose="02070309020205020404" pitchFamily="49" charset="0"/>
+              </a:rPr>
+              <a:t>SlTrace.lg(</a:t>
+            </a:r>
+            <a:r>
+              <a:rPr lang="en-US" sz="2800" dirty="0">
                 <a:solidFill>
-                  <a:srgbClr val="0000FF"/>
+                  <a:schemeClr val="accent2"/>
                 </a:solidFill>
                 <a:latin typeface="Courier New" panose="02070309020205020404" pitchFamily="49" charset="0"/>
-                <a:ea typeface="Times New Roman" panose="02020603050405020304" pitchFamily="18" charset="0"/>
-                <a:cs typeface="Times New Roman" panose="02020603050405020304" pitchFamily="18" charset="0"/>
+                <a:cs typeface="Courier New" panose="02070309020205020404" pitchFamily="49" charset="0"/>
               </a:rPr>
-              <a:t>import</a:t>
-            </a:r>
-            <a:r>
-              <a:rPr lang="en-US" sz="3400" dirty="0">
-                <a:solidFill>
-                  <a:srgbClr val="000000"/>
-                </a:solidFill>
-                <a:latin typeface="Courier New" panose="02070309020205020404" pitchFamily="49" charset="0"/>
-                <a:ea typeface="Times New Roman" panose="02020603050405020304" pitchFamily="18" charset="0"/>
-                <a:cs typeface="Times New Roman" panose="02020603050405020304" pitchFamily="18" charset="0"/>
-              </a:rPr>
-              <a:t> SlTrace</a:t>
-            </a:r>
-            <a:endParaRPr lang="en-US" sz="3400" dirty="0">
-              <a:latin typeface="Courier New" panose="02070309020205020404" pitchFamily="49" charset="0"/>
-              <a:ea typeface="Times New Roman" panose="02020603050405020304" pitchFamily="18" charset="0"/>
-              <a:cs typeface="Times New Roman" panose="02020603050405020304" pitchFamily="18" charset="0"/>
-            </a:endParaRPr>
-          </a:p>
-          <a:p>
-            <a:pPr marL="400050" lvl="1" indent="0" hangingPunct="0">
-              <a:spcBef>
-                <a:spcPts val="0"/>
-              </a:spcBef>
-              <a:buNone/>
-            </a:pPr>
-            <a:r>
-              <a:rPr lang="en-US" sz="3400" dirty="0">
-                <a:solidFill>
-                  <a:srgbClr val="0000FF"/>
-                </a:solidFill>
-                <a:latin typeface="Courier New" panose="02070309020205020404" pitchFamily="49" charset="0"/>
-                <a:ea typeface="Times New Roman" panose="02020603050405020304" pitchFamily="18" charset="0"/>
-                <a:cs typeface="Times New Roman" panose="02020603050405020304" pitchFamily="18" charset="0"/>
-              </a:rPr>
-              <a:t>from</a:t>
-            </a:r>
-            <a:r>
-              <a:rPr lang="en-US" sz="3400" dirty="0">
-                <a:solidFill>
-                  <a:srgbClr val="000000"/>
-                </a:solidFill>
-                <a:latin typeface="Courier New" panose="02070309020205020404" pitchFamily="49" charset="0"/>
-                <a:ea typeface="Times New Roman" panose="02020603050405020304" pitchFamily="18" charset="0"/>
-                <a:cs typeface="Times New Roman" panose="02020603050405020304" pitchFamily="18" charset="0"/>
-              </a:rPr>
-              <a:t> trace_control_window </a:t>
-            </a:r>
-            <a:r>
-              <a:rPr lang="en-US" sz="3400" dirty="0">
-                <a:solidFill>
-                  <a:srgbClr val="0000FF"/>
-                </a:solidFill>
-                <a:latin typeface="Courier New" panose="02070309020205020404" pitchFamily="49" charset="0"/>
-                <a:ea typeface="Times New Roman" panose="02020603050405020304" pitchFamily="18" charset="0"/>
-                <a:cs typeface="Times New Roman" panose="02020603050405020304" pitchFamily="18" charset="0"/>
-              </a:rPr>
-              <a:t>import</a:t>
-            </a:r>
-            <a:r>
-              <a:rPr lang="en-US" sz="3400" dirty="0">
-                <a:solidFill>
-                  <a:srgbClr val="000000"/>
-                </a:solidFill>
-                <a:latin typeface="Courier New" panose="02070309020205020404" pitchFamily="49" charset="0"/>
-                <a:ea typeface="Times New Roman" panose="02020603050405020304" pitchFamily="18" charset="0"/>
-                <a:cs typeface="Times New Roman" panose="02020603050405020304" pitchFamily="18" charset="0"/>
-              </a:rPr>
-              <a:t> TraceControlWindow</a:t>
-            </a:r>
-            <a:endParaRPr lang="en-US" sz="3400" dirty="0">
-              <a:latin typeface="Courier New" panose="02070309020205020404" pitchFamily="49" charset="0"/>
-              <a:ea typeface="Times New Roman" panose="02020603050405020304" pitchFamily="18" charset="0"/>
-              <a:cs typeface="Times New Roman" panose="02020603050405020304" pitchFamily="18" charset="0"/>
-            </a:endParaRPr>
+              <a:t>"Just the minimum for logging")</a:t>
+            </a:r>
           </a:p>
           <a:p>
             <a:endParaRPr lang="en-US" sz="3600" dirty="0"/>
@@ -8230,7 +8204,7 @@
           <a:p>
             <a:fld id="{A7119916-CD40-456D-ABE3-55F8822671F7}" type="datetime1">
               <a:rPr lang="en-US" smtClean="0"/>
-              <a:t>2/29/2020</a:t>
+              <a:t>3/3/2020</a:t>
             </a:fld>
             <a:endParaRPr lang="en-US" dirty="0"/>
           </a:p>
@@ -8296,7 +8270,7 @@
     </p:spTree>
     <p:extLst>
       <p:ext uri="{BB962C8B-B14F-4D97-AF65-F5344CB8AC3E}">
-        <p14:creationId xmlns:p14="http://schemas.microsoft.com/office/powerpoint/2010/main" val="299978649"/>
+        <p14:creationId xmlns:p14="http://schemas.microsoft.com/office/powerpoint/2010/main" val="912761631"/>
       </p:ext>
     </p:extLst>
   </p:cSld>
@@ -8341,21 +8315,12 @@
         </p:nvSpPr>
         <p:spPr/>
         <p:txBody>
-          <a:bodyPr>
-            <a:normAutofit fontScale="90000"/>
-          </a:bodyPr>
+          <a:bodyPr/>
           <a:lstStyle/>
           <a:p>
             <a:r>
               <a:rPr lang="en-US" dirty="0"/>
-              <a:t>TraceControlWindow</a:t>
-            </a:r>
-            <a:br>
-              <a:rPr lang="en-US" dirty="0"/>
-            </a:br>
-            <a:r>
-              <a:rPr lang="en-US" dirty="0"/>
-              <a:t>- Window with selectable flag options</a:t>
+              <a:t>Logging – Logfile contents</a:t>
             </a:r>
             <a:br>
               <a:rPr lang="en-US" dirty="0"/>
@@ -8382,8 +8347,8 @@
         </p:nvSpPr>
         <p:spPr>
           <a:xfrm>
-            <a:off x="677334" y="2160589"/>
-            <a:ext cx="9291856" cy="3880773"/>
+            <a:off x="228601" y="2160589"/>
+            <a:ext cx="10404834" cy="3880773"/>
           </a:xfrm>
         </p:spPr>
         <p:txBody>
@@ -8392,63 +8357,42 @@
           </a:bodyPr>
           <a:lstStyle/>
           <a:p>
-            <a:pPr marL="0" indent="0">
+            <a:pPr marL="400050" lvl="1" indent="0">
               <a:buNone/>
             </a:pPr>
             <a:r>
-              <a:rPr lang="en-US" sz="3600" dirty="0"/>
-              <a:t>Let's take a look.</a:t>
-            </a:r>
-          </a:p>
-          <a:p>
-            <a:pPr marL="0" indent="0">
+              <a:rPr lang="en-US" sz="2800" dirty="0">
+                <a:latin typeface="Courier New" panose="02070309020205020404" pitchFamily="49" charset="0"/>
+                <a:cs typeface="Courier New" panose="02070309020205020404" pitchFamily="49" charset="0"/>
+              </a:rPr>
+              <a:t> 20200223_111219 Creating Log File Name: C:\Users\...absolute_minimum_2020…219.slog</a:t>
+            </a:r>
+          </a:p>
+          <a:p>
+            <a:pPr marL="400050" lvl="1" indent="0">
               <a:buNone/>
             </a:pPr>
             <a:r>
               <a:rPr lang="en-US" sz="3600" dirty="0">
-                <a:solidFill>
-                  <a:srgbClr val="00B0F0"/>
-                </a:solidFill>
+                <a:latin typeface="Courier New" panose="02070309020205020404" pitchFamily="49" charset="0"/>
+                <a:cs typeface="Courier New" panose="02070309020205020404" pitchFamily="49" charset="0"/>
               </a:rPr>
-              <a:t>GitHub raysmith619/resource_lib </a:t>
-            </a:r>
-            <a:r>
-              <a:rPr lang="en-US" sz="3600" dirty="0">
-                <a:solidFill>
-                  <a:schemeClr val="tx1"/>
-                </a:solidFill>
+              <a:t>…</a:t>
+            </a:r>
+          </a:p>
+          <a:p>
+            <a:pPr marL="400050" lvl="1" indent="0">
+              <a:buNone/>
+            </a:pPr>
+            <a:r>
+              <a:rPr lang="en-US" sz="2800" dirty="0">
+                <a:latin typeface="Courier New" panose="02070309020205020404" pitchFamily="49" charset="0"/>
+                <a:cs typeface="Courier New" panose="02070309020205020404" pitchFamily="49" charset="0"/>
               </a:rPr>
-              <a:t>src/</a:t>
-            </a:r>
-            <a:r>
-              <a:rPr lang="en-US" sz="3600" dirty="0">
-                <a:latin typeface="Arial" panose="020B0604020202020204" pitchFamily="34" charset="0"/>
-                <a:ea typeface="Times New Roman" panose="02020603050405020304" pitchFamily="18" charset="0"/>
-                <a:cs typeface="Times New Roman" panose="02020603050405020304" pitchFamily="18" charset="0"/>
-              </a:rPr>
-              <a:t>logging_tracing_menu.py</a:t>
-            </a:r>
-          </a:p>
-          <a:p>
-            <a:pPr marL="0" indent="0" algn="ctr">
-              <a:buNone/>
-            </a:pPr>
-            <a:endParaRPr lang="en-US" sz="3600" dirty="0">
-              <a:latin typeface="Arial" panose="020B0604020202020204" pitchFamily="34" charset="0"/>
-              <a:cs typeface="Times New Roman" panose="02020603050405020304" pitchFamily="18" charset="0"/>
-            </a:endParaRPr>
-          </a:p>
-          <a:p>
-            <a:pPr marL="0" indent="0" algn="ctr">
-              <a:buNone/>
-            </a:pPr>
-            <a:r>
-              <a:rPr lang="en-US" sz="3600" dirty="0">
-                <a:latin typeface="Arial" panose="020B0604020202020204" pitchFamily="34" charset="0"/>
-                <a:cs typeface="Times New Roman" panose="02020603050405020304" pitchFamily="18" charset="0"/>
-              </a:rPr>
-              <a:t>DEMO</a:t>
-            </a:r>
+              <a:t> 20200223_111219 Just the minimum for logging</a:t>
+            </a:r>
+          </a:p>
+          <a:p>
             <a:endParaRPr lang="en-US" sz="3600" dirty="0"/>
           </a:p>
         </p:txBody>
@@ -8476,7 +8420,7 @@
           <a:p>
             <a:fld id="{A7119916-CD40-456D-ABE3-55F8822671F7}" type="datetime1">
               <a:rPr lang="en-US" smtClean="0"/>
-              <a:t>2/29/2020</a:t>
+              <a:t>3/3/2020</a:t>
             </a:fld>
             <a:endParaRPr lang="en-US" dirty="0"/>
           </a:p>
@@ -8542,7 +8486,7 @@
     </p:spTree>
     <p:extLst>
       <p:ext uri="{BB962C8B-B14F-4D97-AF65-F5344CB8AC3E}">
-        <p14:creationId xmlns:p14="http://schemas.microsoft.com/office/powerpoint/2010/main" val="4057884265"/>
+        <p14:creationId xmlns:p14="http://schemas.microsoft.com/office/powerpoint/2010/main" val="257724182"/>
       </p:ext>
     </p:extLst>
   </p:cSld>
@@ -8601,7 +8545,7 @@
             </a:br>
             <a:r>
               <a:rPr lang="en-US" dirty="0"/>
-              <a:t>- A Look Inside</a:t>
+              <a:t>- Window with selectable flag options</a:t>
             </a:r>
             <a:br>
               <a:rPr lang="en-US" dirty="0"/>
@@ -8634,55 +8578,130 @@
         </p:spPr>
         <p:txBody>
           <a:bodyPr>
-            <a:normAutofit lnSpcReduction="10000"/>
+            <a:normAutofit/>
           </a:bodyPr>
           <a:lstStyle/>
           <a:p>
             <a:r>
               <a:rPr lang="en-US" sz="3600" dirty="0"/>
-              <a:t>Uses Python's tkinter</a:t>
-            </a:r>
-          </a:p>
-          <a:p>
-            <a:pPr lvl="1"/>
-            <a:r>
-              <a:rPr lang="en-US" sz="3400" dirty="0"/>
-              <a:t>Tk(), .update(), .after(), .destroy()</a:t>
-            </a:r>
-          </a:p>
-          <a:p>
-            <a:r>
-              <a:rPr lang="en-US" sz="3600" dirty="0"/>
-              <a:t>Integrates with GUI programs as pop-up</a:t>
-            </a:r>
-          </a:p>
-          <a:p>
-            <a:r>
-              <a:rPr lang="en-US" sz="3600" dirty="0"/>
-              <a:t>Supports standalone operation</a:t>
-            </a:r>
-          </a:p>
-          <a:p>
-            <a:pPr lvl="1"/>
-            <a:r>
-              <a:rPr lang="en-US" sz="3400" dirty="0"/>
-              <a:t>Creates option window</a:t>
-            </a:r>
-          </a:p>
-          <a:p>
-            <a:pPr lvl="1"/>
-            <a:r>
-              <a:rPr lang="en-US" sz="3400" dirty="0"/>
-              <a:t>Closes window on exit</a:t>
-            </a:r>
-          </a:p>
-          <a:p>
-            <a:endParaRPr lang="en-US" sz="3600" dirty="0"/>
-          </a:p>
-          <a:p>
-            <a:pPr marL="0" indent="0">
+              <a:t>Only two setup lines!:</a:t>
+            </a:r>
+          </a:p>
+          <a:p>
+            <a:pPr marL="400050" lvl="1" indent="0" hangingPunct="0">
+              <a:spcBef>
+                <a:spcPts val="0"/>
+              </a:spcBef>
               <a:buNone/>
             </a:pPr>
+            <a:r>
+              <a:rPr lang="en-US" sz="3400" dirty="0">
+                <a:solidFill>
+                  <a:schemeClr val="accent4"/>
+                </a:solidFill>
+                <a:latin typeface="Courier New" panose="02070309020205020404" pitchFamily="49" charset="0"/>
+                <a:ea typeface="Times New Roman" panose="02020603050405020304" pitchFamily="18" charset="0"/>
+                <a:cs typeface="Times New Roman" panose="02020603050405020304" pitchFamily="18" charset="0"/>
+              </a:rPr>
+              <a:t>from</a:t>
+            </a:r>
+            <a:r>
+              <a:rPr lang="en-US" sz="3400" dirty="0">
+                <a:solidFill>
+                  <a:srgbClr val="000000"/>
+                </a:solidFill>
+                <a:latin typeface="Courier New" panose="02070309020205020404" pitchFamily="49" charset="0"/>
+                <a:ea typeface="Times New Roman" panose="02020603050405020304" pitchFamily="18" charset="0"/>
+                <a:cs typeface="Times New Roman" panose="02020603050405020304" pitchFamily="18" charset="0"/>
+              </a:rPr>
+              <a:t> select_trace </a:t>
+            </a:r>
+            <a:r>
+              <a:rPr lang="en-US" sz="3400" dirty="0">
+                <a:solidFill>
+                  <a:schemeClr val="accent4"/>
+                </a:solidFill>
+                <a:latin typeface="Courier New" panose="02070309020205020404" pitchFamily="49" charset="0"/>
+                <a:ea typeface="Times New Roman" panose="02020603050405020304" pitchFamily="18" charset="0"/>
+                <a:cs typeface="Times New Roman" panose="02020603050405020304" pitchFamily="18" charset="0"/>
+              </a:rPr>
+              <a:t>import</a:t>
+            </a:r>
+            <a:r>
+              <a:rPr lang="en-US" sz="3400" dirty="0">
+                <a:solidFill>
+                  <a:srgbClr val="000000"/>
+                </a:solidFill>
+                <a:latin typeface="Courier New" panose="02070309020205020404" pitchFamily="49" charset="0"/>
+                <a:ea typeface="Times New Roman" panose="02020603050405020304" pitchFamily="18" charset="0"/>
+                <a:cs typeface="Times New Roman" panose="02020603050405020304" pitchFamily="18" charset="0"/>
+              </a:rPr>
+              <a:t> SlTrace</a:t>
+            </a:r>
+            <a:endParaRPr lang="en-US" sz="3400" dirty="0">
+              <a:latin typeface="Courier New" panose="02070309020205020404" pitchFamily="49" charset="0"/>
+              <a:ea typeface="Times New Roman" panose="02020603050405020304" pitchFamily="18" charset="0"/>
+              <a:cs typeface="Times New Roman" panose="02020603050405020304" pitchFamily="18" charset="0"/>
+            </a:endParaRPr>
+          </a:p>
+          <a:p>
+            <a:pPr marL="400050" lvl="1" indent="0" hangingPunct="0">
+              <a:spcBef>
+                <a:spcPts val="0"/>
+              </a:spcBef>
+              <a:buNone/>
+            </a:pPr>
+            <a:r>
+              <a:rPr lang="en-US" sz="3400" dirty="0">
+                <a:solidFill>
+                  <a:schemeClr val="accent4"/>
+                </a:solidFill>
+                <a:latin typeface="Courier New" panose="02070309020205020404" pitchFamily="49" charset="0"/>
+                <a:ea typeface="Times New Roman" panose="02020603050405020304" pitchFamily="18" charset="0"/>
+                <a:cs typeface="Times New Roman" panose="02020603050405020304" pitchFamily="18" charset="0"/>
+              </a:rPr>
+              <a:t>from</a:t>
+            </a:r>
+            <a:r>
+              <a:rPr lang="en-US" sz="3400" dirty="0">
+                <a:solidFill>
+                  <a:srgbClr val="000000"/>
+                </a:solidFill>
+                <a:latin typeface="Courier New" panose="02070309020205020404" pitchFamily="49" charset="0"/>
+                <a:ea typeface="Times New Roman" panose="02020603050405020304" pitchFamily="18" charset="0"/>
+                <a:cs typeface="Times New Roman" panose="02020603050405020304" pitchFamily="18" charset="0"/>
+              </a:rPr>
+              <a:t> trace_control_window </a:t>
+            </a:r>
+            <a:r>
+              <a:rPr lang="en-US" sz="3400" dirty="0">
+                <a:solidFill>
+                  <a:schemeClr val="accent4"/>
+                </a:solidFill>
+                <a:latin typeface="Courier New" panose="02070309020205020404" pitchFamily="49" charset="0"/>
+                <a:ea typeface="Times New Roman" panose="02020603050405020304" pitchFamily="18" charset="0"/>
+                <a:cs typeface="Times New Roman" panose="02020603050405020304" pitchFamily="18" charset="0"/>
+              </a:rPr>
+              <a:t>import</a:t>
+            </a:r>
+            <a:r>
+              <a:rPr lang="en-US" sz="3400" dirty="0">
+                <a:solidFill>
+                  <a:srgbClr val="000000"/>
+                </a:solidFill>
+                <a:latin typeface="Courier New" panose="02070309020205020404" pitchFamily="49" charset="0"/>
+                <a:ea typeface="Times New Roman" panose="02020603050405020304" pitchFamily="18" charset="0"/>
+                <a:cs typeface="Times New Roman" panose="02020603050405020304" pitchFamily="18" charset="0"/>
+              </a:rPr>
+              <a:t> TraceControlWindow</a:t>
+            </a:r>
+            <a:endParaRPr lang="en-US" sz="3400" dirty="0">
+              <a:latin typeface="Courier New" panose="02070309020205020404" pitchFamily="49" charset="0"/>
+              <a:ea typeface="Times New Roman" panose="02020603050405020304" pitchFamily="18" charset="0"/>
+              <a:cs typeface="Times New Roman" panose="02020603050405020304" pitchFamily="18" charset="0"/>
+            </a:endParaRPr>
+          </a:p>
+          <a:p>
             <a:endParaRPr lang="en-US" sz="3600" dirty="0"/>
           </a:p>
         </p:txBody>
@@ -8710,7 +8729,7 @@
           <a:p>
             <a:fld id="{A7119916-CD40-456D-ABE3-55F8822671F7}" type="datetime1">
               <a:rPr lang="en-US" smtClean="0"/>
-              <a:t>2/29/2020</a:t>
+              <a:t>3/3/2020</a:t>
             </a:fld>
             <a:endParaRPr lang="en-US" dirty="0"/>
           </a:p>
@@ -8776,7 +8795,7 @@
     </p:spTree>
     <p:extLst>
       <p:ext uri="{BB962C8B-B14F-4D97-AF65-F5344CB8AC3E}">
-        <p14:creationId xmlns:p14="http://schemas.microsoft.com/office/powerpoint/2010/main" val="2747733063"/>
+        <p14:creationId xmlns:p14="http://schemas.microsoft.com/office/powerpoint/2010/main" val="299978649"/>
       </p:ext>
     </p:extLst>
   </p:cSld>
@@ -8835,11 +8854,8 @@
             </a:br>
             <a:r>
               <a:rPr lang="en-US" dirty="0"/>
-              <a:t>- trace_control_window.py</a:t>
-            </a:r>
-            <a:br>
-              <a:rPr lang="en-US" dirty="0"/>
-            </a:br>
+              <a:t>- Window with selectable flag options</a:t>
+            </a:r>
             <a:br>
               <a:rPr lang="en-US" dirty="0"/>
             </a:br>
@@ -8871,19 +8887,16 @@
         </p:spPr>
         <p:txBody>
           <a:bodyPr>
-            <a:normAutofit fontScale="70000" lnSpcReduction="20000"/>
+            <a:normAutofit/>
           </a:bodyPr>
           <a:lstStyle/>
           <a:p>
-            <a:endParaRPr lang="en-US" sz="3600" dirty="0"/>
-          </a:p>
-          <a:p>
             <a:pPr marL="0" indent="0">
               <a:buNone/>
             </a:pPr>
             <a:r>
-              <a:rPr lang="en-US" sz="4100" dirty="0"/>
-              <a:t>class TraceControlWindow(Toplevel):</a:t>
+              <a:rPr lang="en-US" sz="3600" dirty="0"/>
+              <a:t>Let's take a look.</a:t>
             </a:r>
           </a:p>
           <a:p>
@@ -8891,50 +8904,50 @@
               <a:buNone/>
             </a:pPr>
             <a:r>
-              <a:rPr lang="en-US" sz="4100" dirty="0"/>
-              <a:t>    def __init__(self, tcbase=None, change_call=None):</a:t>
-            </a:r>
-          </a:p>
-          <a:p>
-            <a:pPr marL="0" indent="0">
+              <a:rPr lang="en-US" sz="3600" dirty="0">
+                <a:solidFill>
+                  <a:srgbClr val="00B0F0"/>
+                </a:solidFill>
+              </a:rPr>
+              <a:t>GitHub raysmith619/resource_lib </a:t>
+            </a:r>
+            <a:r>
+              <a:rPr lang="en-US" sz="3600" dirty="0">
+                <a:solidFill>
+                  <a:schemeClr val="tx1"/>
+                </a:solidFill>
+              </a:rPr>
+              <a:t>src/</a:t>
+            </a:r>
+            <a:r>
+              <a:rPr lang="en-US" sz="3600" dirty="0">
+                <a:latin typeface="Arial" panose="020B0604020202020204" pitchFamily="34" charset="0"/>
+                <a:ea typeface="Times New Roman" panose="02020603050405020304" pitchFamily="18" charset="0"/>
+                <a:cs typeface="Times New Roman" panose="02020603050405020304" pitchFamily="18" charset="0"/>
+              </a:rPr>
+              <a:t>logging_tracing_menu.py</a:t>
+            </a:r>
+          </a:p>
+          <a:p>
+            <a:pPr marL="0" indent="0" algn="ctr">
               <a:buNone/>
             </a:pPr>
-            <a:r>
-              <a:rPr lang="en-US" sz="4100" dirty="0"/>
-              <a:t>        """ Trace flag dictionary</a:t>
-            </a:r>
-          </a:p>
-          <a:p>
-            <a:pPr marL="0" indent="0">
+            <a:endParaRPr lang="en-US" sz="3600" dirty="0">
+              <a:latin typeface="Arial" panose="020B0604020202020204" pitchFamily="34" charset="0"/>
+              <a:cs typeface="Times New Roman" panose="02020603050405020304" pitchFamily="18" charset="0"/>
+            </a:endParaRPr>
+          </a:p>
+          <a:p>
+            <a:pPr marL="0" indent="0" algn="ctr">
               <a:buNone/>
             </a:pPr>
             <a:r>
-              <a:rPr lang="en-US" sz="4100" dirty="0"/>
-              <a:t>        :tcbase: - parent - call basis …</a:t>
-            </a:r>
-          </a:p>
-          <a:p>
-            <a:pPr marL="0" indent="0">
-              <a:buNone/>
-            </a:pPr>
-            <a:r>
-              <a:rPr lang="en-US" sz="4100" dirty="0"/>
-              <a:t>        :change_call: - call with flag, value, if present</a:t>
-            </a:r>
-          </a:p>
-          <a:p>
-            <a:pPr marL="0" indent="0">
-              <a:buNone/>
-            </a:pPr>
-            <a:r>
-              <a:rPr lang="en-US" sz="4100" dirty="0"/>
-              <a:t>        """</a:t>
-            </a:r>
-          </a:p>
-          <a:p>
-            <a:pPr marL="0" indent="0">
-              <a:buNone/>
-            </a:pPr>
+              <a:rPr lang="en-US" sz="3600" dirty="0">
+                <a:latin typeface="Arial" panose="020B0604020202020204" pitchFamily="34" charset="0"/>
+                <a:cs typeface="Times New Roman" panose="02020603050405020304" pitchFamily="18" charset="0"/>
+              </a:rPr>
+              <a:t>DEMO</a:t>
+            </a:r>
             <a:endParaRPr lang="en-US" sz="3600" dirty="0"/>
           </a:p>
         </p:txBody>
@@ -8962,7 +8975,7 @@
           <a:p>
             <a:fld id="{A7119916-CD40-456D-ABE3-55F8822671F7}" type="datetime1">
               <a:rPr lang="en-US" smtClean="0"/>
-              <a:t>2/29/2020</a:t>
+              <a:t>3/3/2020</a:t>
             </a:fld>
             <a:endParaRPr lang="en-US" dirty="0"/>
           </a:p>
@@ -9028,7 +9041,7 @@
     </p:spTree>
     <p:extLst>
       <p:ext uri="{BB962C8B-B14F-4D97-AF65-F5344CB8AC3E}">
-        <p14:creationId xmlns:p14="http://schemas.microsoft.com/office/powerpoint/2010/main" val="1614038144"/>
+        <p14:creationId xmlns:p14="http://schemas.microsoft.com/office/powerpoint/2010/main" val="4057884265"/>
       </p:ext>
     </p:extLst>
   </p:cSld>
@@ -9087,11 +9100,8 @@
             </a:br>
             <a:r>
               <a:rPr lang="en-US" dirty="0"/>
-              <a:t>- trace_control_window.py - continued</a:t>
-            </a:r>
-            <a:br>
-              <a:rPr lang="en-US" dirty="0"/>
-            </a:br>
+              <a:t>- A Look Inside</a:t>
+            </a:r>
             <a:br>
               <a:rPr lang="en-US" dirty="0"/>
             </a:br>
@@ -9123,95 +9133,50 @@
         </p:spPr>
         <p:txBody>
           <a:bodyPr>
-            <a:normAutofit fontScale="70000" lnSpcReduction="20000"/>
+            <a:normAutofit lnSpcReduction="10000"/>
           </a:bodyPr>
           <a:lstStyle/>
           <a:p>
-            <a:pPr marL="0" indent="0">
-              <a:buNone/>
-            </a:pPr>
-            <a:r>
-              <a:rPr lang="en-US" sz="3600" i="1" dirty="0"/>
-              <a:t> </a:t>
-            </a:r>
-            <a:r>
-              <a:rPr lang="en-US" sz="3600" i="1" dirty="0">
-                <a:solidFill>
-                  <a:srgbClr val="00B0F0"/>
-                </a:solidFill>
-              </a:rPr>
-              <a:t>… more .__init__ function …</a:t>
-            </a:r>
+            <a:r>
+              <a:rPr lang="en-US" sz="3600" dirty="0"/>
+              <a:t>Uses Python's tkinter</a:t>
+            </a:r>
+          </a:p>
+          <a:p>
+            <a:pPr lvl="1"/>
+            <a:r>
+              <a:rPr lang="en-US" sz="3400" dirty="0"/>
+              <a:t>Tk(), .update(), .after(), .destroy()</a:t>
+            </a:r>
+          </a:p>
+          <a:p>
+            <a:r>
+              <a:rPr lang="en-US" sz="3600" dirty="0"/>
+              <a:t>Integrates with GUI programs as pop-up</a:t>
+            </a:r>
+          </a:p>
+          <a:p>
+            <a:r>
+              <a:rPr lang="en-US" sz="3600" dirty="0"/>
+              <a:t>Supports standalone operation</a:t>
+            </a:r>
+          </a:p>
+          <a:p>
+            <a:pPr lvl="1"/>
+            <a:r>
+              <a:rPr lang="en-US" sz="3400" dirty="0"/>
+              <a:t>Creates option window</a:t>
+            </a:r>
+          </a:p>
+          <a:p>
+            <a:pPr lvl="1"/>
+            <a:r>
+              <a:rPr lang="en-US" sz="3400" dirty="0"/>
+              <a:t>Closes window on exit</a:t>
+            </a:r>
+          </a:p>
+          <a:p>
             <a:endParaRPr lang="en-US" sz="3600" dirty="0"/>
-          </a:p>
-          <a:p>
-            <a:pPr marL="0" indent="0">
-              <a:buNone/>
-            </a:pPr>
-            <a:r>
-              <a:rPr lang="en-US" sz="4100" dirty="0"/>
-              <a:t>        self.standalone = False      # True if standalone</a:t>
-            </a:r>
-          </a:p>
-          <a:p>
-            <a:pPr marL="0" indent="0">
-              <a:buNone/>
-            </a:pPr>
-            <a:r>
-              <a:rPr lang="en-US" sz="4100" dirty="0"/>
-              <a:t>        if tcbase is None:</a:t>
-            </a:r>
-          </a:p>
-          <a:p>
-            <a:pPr marL="0" indent="0">
-              <a:buNone/>
-            </a:pPr>
-            <a:r>
-              <a:rPr lang="en-US" sz="4100" dirty="0"/>
-              <a:t>            SlTrace.lg("Standalone TraceControlWindow")</a:t>
-            </a:r>
-          </a:p>
-          <a:p>
-            <a:pPr marL="0" indent="0">
-              <a:buNone/>
-            </a:pPr>
-            <a:r>
-              <a:rPr lang="en-US" sz="4100" dirty="0"/>
-              <a:t>            root = Tk()</a:t>
-            </a:r>
-          </a:p>
-          <a:p>
-            <a:pPr marL="0" indent="0">
-              <a:buNone/>
-            </a:pPr>
-            <a:r>
-              <a:rPr lang="en-US" sz="4100" dirty="0"/>
-              <a:t>            frame = Frame(root)</a:t>
-            </a:r>
-          </a:p>
-          <a:p>
-            <a:pPr marL="0" indent="0">
-              <a:buNone/>
-            </a:pPr>
-            <a:r>
-              <a:rPr lang="en-US" sz="4100" dirty="0"/>
-              <a:t>            frame.pack()</a:t>
-            </a:r>
-          </a:p>
-          <a:p>
-            <a:pPr marL="0" indent="0">
-              <a:buNone/>
-            </a:pPr>
-            <a:r>
-              <a:rPr lang="en-US" sz="4100" dirty="0"/>
-              <a:t>            self.standalone = True</a:t>
-            </a:r>
-          </a:p>
-          <a:p>
-            <a:pPr marL="0" indent="0">
-              <a:buNone/>
-            </a:pPr>
-            <a:endParaRPr lang="en-US" sz="4100" dirty="0"/>
           </a:p>
           <a:p>
             <a:pPr marL="0" indent="0">
@@ -9244,7 +9209,7 @@
           <a:p>
             <a:fld id="{A7119916-CD40-456D-ABE3-55F8822671F7}" type="datetime1">
               <a:rPr lang="en-US" smtClean="0"/>
-              <a:t>2/29/2020</a:t>
+              <a:t>3/3/2020</a:t>
             </a:fld>
             <a:endParaRPr lang="en-US" dirty="0"/>
           </a:p>
@@ -9310,7 +9275,7 @@
     </p:spTree>
     <p:extLst>
       <p:ext uri="{BB962C8B-B14F-4D97-AF65-F5344CB8AC3E}">
-        <p14:creationId xmlns:p14="http://schemas.microsoft.com/office/powerpoint/2010/main" val="1545632865"/>
+        <p14:creationId xmlns:p14="http://schemas.microsoft.com/office/powerpoint/2010/main" val="2747733063"/>
       </p:ext>
     </p:extLst>
   </p:cSld>
@@ -9369,7 +9334,7 @@
             </a:br>
             <a:r>
               <a:rPr lang="en-US" dirty="0"/>
-              <a:t>- trace_control_window.py - continued</a:t>
+              <a:t>- trace_control_window.py</a:t>
             </a:r>
             <a:br>
               <a:rPr lang="en-US" dirty="0"/>
@@ -9399,30 +9364,82 @@
         </p:nvSpPr>
         <p:spPr>
           <a:xfrm>
-            <a:off x="660401" y="1737255"/>
+            <a:off x="677334" y="2160589"/>
             <a:ext cx="9291856" cy="3880773"/>
           </a:xfrm>
         </p:spPr>
         <p:txBody>
           <a:bodyPr>
-            <a:normAutofit/>
+            <a:normAutofit fontScale="70000" lnSpcReduction="20000"/>
           </a:bodyPr>
           <a:lstStyle/>
           <a:p>
+            <a:endParaRPr lang="en-US" sz="3600" dirty="0"/>
+          </a:p>
+          <a:p>
             <a:pPr marL="0" indent="0">
               <a:buNone/>
             </a:pPr>
             <a:r>
-              <a:rPr lang="en-US" sz="3800" i="1" dirty="0"/>
+              <a:rPr lang="en-US" sz="4100" dirty="0"/>
+              <a:t>class TraceControlWindow(Toplevel):</a:t>
+            </a:r>
+          </a:p>
+          <a:p>
+            <a:pPr marL="0" indent="0">
+              <a:buNone/>
+            </a:pPr>
+            <a:r>
+              <a:rPr lang="en-US" sz="4100" dirty="0"/>
               <a:t>    </a:t>
             </a:r>
             <a:r>
-              <a:rPr lang="en-US" sz="3800" i="1" dirty="0">
+              <a:rPr lang="en-US" sz="4100" dirty="0">
+                <a:solidFill>
+                  <a:schemeClr val="accent4"/>
+                </a:solidFill>
+              </a:rPr>
+              <a:t>def</a:t>
+            </a:r>
+            <a:r>
+              <a:rPr lang="en-US" sz="4100" dirty="0"/>
+              <a:t> </a:t>
+            </a:r>
+            <a:r>
+              <a:rPr lang="en-US" sz="4100" dirty="0">
                 <a:solidFill>
                   <a:srgbClr val="00B0F0"/>
                 </a:solidFill>
               </a:rPr>
-              <a:t>… end of .__init__ function …</a:t>
+              <a:t>__init__</a:t>
+            </a:r>
+            <a:r>
+              <a:rPr lang="en-US" sz="4100" dirty="0"/>
+              <a:t>(self, tcbase=</a:t>
+            </a:r>
+            <a:r>
+              <a:rPr lang="en-US" sz="4100" dirty="0">
+                <a:solidFill>
+                  <a:schemeClr val="accent4"/>
+                </a:solidFill>
+              </a:rPr>
+              <a:t>None</a:t>
+            </a:r>
+            <a:r>
+              <a:rPr lang="en-US" sz="4100" dirty="0"/>
+              <a:t>, change_call=</a:t>
+            </a:r>
+            <a:r>
+              <a:rPr lang="en-US" sz="4100" dirty="0">
+                <a:solidFill>
+                  <a:schemeClr val="accent4"/>
+                </a:solidFill>
+              </a:rPr>
+              <a:t>None</a:t>
+            </a:r>
+            <a:r>
+              <a:rPr lang="en-US" sz="4100" dirty="0"/>
+              <a:t>):</a:t>
             </a:r>
           </a:p>
           <a:p>
@@ -9430,8 +9447,23 @@
               <a:buNone/>
             </a:pPr>
             <a:r>
-              <a:rPr lang="en-US" sz="3200" i="1" dirty="0"/>
-              <a:t>if self.standalone:</a:t>
+              <a:rPr lang="en-US" sz="4100" dirty="0">
+                <a:solidFill>
+                  <a:schemeClr val="accent2">
+                    <a:lumMod val="60000"/>
+                    <a:lumOff val="40000"/>
+                  </a:schemeClr>
+                </a:solidFill>
+              </a:rPr>
+              <a:t>        </a:t>
+            </a:r>
+            <a:r>
+              <a:rPr lang="en-US" sz="4100" dirty="0">
+                <a:solidFill>
+                  <a:schemeClr val="accent2"/>
+                </a:solidFill>
+              </a:rPr>
+              <a:t>""" Trace flag dictionary</a:t>
             </a:r>
           </a:p>
           <a:p>
@@ -9439,8 +9471,12 @@
               <a:buNone/>
             </a:pPr>
             <a:r>
-              <a:rPr lang="en-US" sz="3200" i="1" dirty="0"/>
-              <a:t>            atexit.register(self.on_exit)</a:t>
+              <a:rPr lang="en-US" sz="4100" dirty="0">
+                <a:solidFill>
+                  <a:schemeClr val="accent2"/>
+                </a:solidFill>
+              </a:rPr>
+              <a:t>        :tcbase: - parent - call basis …</a:t>
             </a:r>
           </a:p>
           <a:p>
@@ -9448,8 +9484,25 @@
               <a:buNone/>
             </a:pPr>
             <a:r>
-              <a:rPr lang="en-US" sz="3200" i="1" dirty="0"/>
-              <a:t>            self.update_loop()</a:t>
+              <a:rPr lang="en-US" sz="4100" dirty="0">
+                <a:solidFill>
+                  <a:schemeClr val="accent2"/>
+                </a:solidFill>
+              </a:rPr>
+              <a:t>        :change_call: - call with flag, value, if present</a:t>
+            </a:r>
+          </a:p>
+          <a:p>
+            <a:pPr marL="0" indent="0">
+              <a:buNone/>
+            </a:pPr>
+            <a:r>
+              <a:rPr lang="en-US" sz="4100" dirty="0">
+                <a:solidFill>
+                  <a:schemeClr val="accent2"/>
+                </a:solidFill>
+              </a:rPr>
+              <a:t>        """</a:t>
             </a:r>
           </a:p>
           <a:p>
@@ -9483,7 +9536,7 @@
           <a:p>
             <a:fld id="{A7119916-CD40-456D-ABE3-55F8822671F7}" type="datetime1">
               <a:rPr lang="en-US" smtClean="0"/>
-              <a:t>2/29/2020</a:t>
+              <a:t>3/3/2020</a:t>
             </a:fld>
             <a:endParaRPr lang="en-US" dirty="0"/>
           </a:p>
@@ -9549,7 +9602,7 @@
     </p:spTree>
     <p:extLst>
       <p:ext uri="{BB962C8B-B14F-4D97-AF65-F5344CB8AC3E}">
-        <p14:creationId xmlns:p14="http://schemas.microsoft.com/office/powerpoint/2010/main" val="3654383725"/>
+        <p14:creationId xmlns:p14="http://schemas.microsoft.com/office/powerpoint/2010/main" val="1614038144"/>
       </p:ext>
     </p:extLst>
   </p:cSld>
@@ -9638,13 +9691,13 @@
         </p:nvSpPr>
         <p:spPr>
           <a:xfrm>
-            <a:off x="321733" y="2160589"/>
-            <a:ext cx="10498667" cy="3880773"/>
+            <a:off x="677334" y="2160589"/>
+            <a:ext cx="9291856" cy="3880773"/>
           </a:xfrm>
         </p:spPr>
         <p:txBody>
           <a:bodyPr>
-            <a:normAutofit fontScale="25000" lnSpcReduction="20000"/>
+            <a:normAutofit fontScale="70000" lnSpcReduction="20000"/>
           </a:bodyPr>
           <a:lstStyle/>
           <a:p>
@@ -9652,17 +9705,46 @@
               <a:buNone/>
             </a:pPr>
             <a:r>
-              <a:rPr lang="en-US" sz="3800" dirty="0"/>
-              <a:t>        </a:t>
-            </a:r>
+              <a:rPr lang="en-US" sz="3600" i="1" dirty="0"/>
+              <a:t> </a:t>
+            </a:r>
+            <a:r>
+              <a:rPr lang="en-US" sz="3600" i="1" dirty="0">
+                <a:solidFill>
+                  <a:srgbClr val="00B0F0"/>
+                </a:solidFill>
+              </a:rPr>
+              <a:t>… more .__init__ function …</a:t>
+            </a:r>
+            <a:endParaRPr lang="en-US" sz="3600" dirty="0"/>
           </a:p>
           <a:p>
             <a:pPr marL="0" indent="0">
               <a:buNone/>
             </a:pPr>
             <a:r>
-              <a:rPr lang="en-US" sz="12800" dirty="0"/>
-              <a:t>def update_loop(self):</a:t>
+              <a:rPr lang="en-US" sz="4100" dirty="0"/>
+              <a:t>        self.standalone = </a:t>
+            </a:r>
+            <a:r>
+              <a:rPr lang="en-US" sz="4100" dirty="0">
+                <a:solidFill>
+                  <a:schemeClr val="accent4"/>
+                </a:solidFill>
+              </a:rPr>
+              <a:t>False</a:t>
+            </a:r>
+            <a:r>
+              <a:rPr lang="en-US" sz="4100" dirty="0"/>
+              <a:t>      </a:t>
+            </a:r>
+            <a:r>
+              <a:rPr lang="en-US" sz="4100" dirty="0">
+                <a:solidFill>
+                  <a:schemeClr val="accent5"/>
+                </a:solidFill>
+              </a:rPr>
+              <a:t># True if standalone</a:t>
             </a:r>
           </a:p>
           <a:p>
@@ -9670,8 +9752,8 @@
               <a:buNone/>
             </a:pPr>
             <a:r>
-              <a:rPr lang="en-US" sz="12800" dirty="0"/>
-              <a:t>        """ continue repeated tk.update() calls</a:t>
+              <a:rPr lang="en-US" sz="4100" dirty="0"/>
+              <a:t>        if tcbase is None:</a:t>
             </a:r>
           </a:p>
           <a:p>
@@ -9679,8 +9761,19 @@
               <a:buNone/>
             </a:pPr>
             <a:r>
-              <a:rPr lang="en-US" sz="12800" dirty="0"/>
-              <a:t>        to enable window operation</a:t>
+              <a:rPr lang="en-US" sz="4100" dirty="0"/>
+              <a:t>            SlTrace.lg(</a:t>
+            </a:r>
+            <a:r>
+              <a:rPr lang="en-US" sz="4100" dirty="0">
+                <a:solidFill>
+                  <a:schemeClr val="accent2">
+                    <a:lumMod val="60000"/>
+                    <a:lumOff val="40000"/>
+                  </a:schemeClr>
+                </a:solidFill>
+              </a:rPr>
+              <a:t>"Standalone TraceControlWindow")</a:t>
             </a:r>
           </a:p>
           <a:p>
@@ -9688,8 +9781,8 @@
               <a:buNone/>
             </a:pPr>
             <a:r>
-              <a:rPr lang="en-US" sz="12800" dirty="0"/>
-              <a:t>        """</a:t>
+              <a:rPr lang="en-US" sz="4100" dirty="0"/>
+              <a:t>            root = Tk()</a:t>
             </a:r>
           </a:p>
           <a:p>
@@ -9697,8 +9790,8 @@
               <a:buNone/>
             </a:pPr>
             <a:r>
-              <a:rPr lang="en-US" sz="12800" dirty="0"/>
-              <a:t>        loop_time = 50          # Loop recall time (msec)</a:t>
+              <a:rPr lang="en-US" sz="4100" dirty="0"/>
+              <a:t>            frame = Frame(root)</a:t>
             </a:r>
           </a:p>
           <a:p>
@@ -9706,8 +9799,8 @@
               <a:buNone/>
             </a:pPr>
             <a:r>
-              <a:rPr lang="en-US" sz="12800" dirty="0"/>
-              <a:t>        self.tc_mw.update()	# Update tkinter stuff</a:t>
+              <a:rPr lang="en-US" sz="4100" dirty="0"/>
+              <a:t>            frame.pack()</a:t>
             </a:r>
           </a:p>
           <a:p>
@@ -9715,15 +9808,23 @@
               <a:buNone/>
             </a:pPr>
             <a:r>
-              <a:rPr lang="en-US" sz="12800" dirty="0"/>
-              <a:t>        self.tc_mw.after(loop_time, self.update_loop)</a:t>
+              <a:rPr lang="en-US" sz="4100" dirty="0"/>
+              <a:t>            self.standalone = </a:t>
+            </a:r>
+            <a:r>
+              <a:rPr lang="en-US" sz="4100" dirty="0">
+                <a:solidFill>
+                  <a:schemeClr val="accent4"/>
+                </a:solidFill>
+              </a:rPr>
+              <a:t>True</a:t>
             </a:r>
           </a:p>
           <a:p>
             <a:pPr marL="0" indent="0">
               <a:buNone/>
             </a:pPr>
-            <a:endParaRPr lang="en-US" sz="9800" dirty="0"/>
+            <a:endParaRPr lang="en-US" sz="4100" dirty="0"/>
           </a:p>
           <a:p>
             <a:pPr marL="0" indent="0">
@@ -9756,7 +9857,7 @@
           <a:p>
             <a:fld id="{A7119916-CD40-456D-ABE3-55F8822671F7}" type="datetime1">
               <a:rPr lang="en-US" smtClean="0"/>
-              <a:t>2/29/2020</a:t>
+              <a:t>3/3/2020</a:t>
             </a:fld>
             <a:endParaRPr lang="en-US" dirty="0"/>
           </a:p>
@@ -9822,7 +9923,7 @@
     </p:spTree>
     <p:extLst>
       <p:ext uri="{BB962C8B-B14F-4D97-AF65-F5344CB8AC3E}">
-        <p14:creationId xmlns:p14="http://schemas.microsoft.com/office/powerpoint/2010/main" val="3679562782"/>
+        <p14:creationId xmlns:p14="http://schemas.microsoft.com/office/powerpoint/2010/main" val="1545632865"/>
       </p:ext>
     </p:extLst>
   </p:cSld>
@@ -9911,13 +10012,13 @@
         </p:nvSpPr>
         <p:spPr>
           <a:xfrm>
-            <a:off x="440267" y="2160589"/>
-            <a:ext cx="10126133" cy="3880773"/>
+            <a:off x="660401" y="1737255"/>
+            <a:ext cx="9291856" cy="3880773"/>
           </a:xfrm>
         </p:spPr>
         <p:txBody>
           <a:bodyPr>
-            <a:normAutofit fontScale="32500" lnSpcReduction="20000"/>
+            <a:normAutofit/>
           </a:bodyPr>
           <a:lstStyle/>
           <a:p>
@@ -9925,8 +10026,16 @@
               <a:buNone/>
             </a:pPr>
             <a:r>
-              <a:rPr lang="en-US" sz="3800" dirty="0"/>
-              <a:t>        </a:t>
+              <a:rPr lang="en-US" sz="3800" i="1" dirty="0"/>
+              <a:t>    </a:t>
+            </a:r>
+            <a:r>
+              <a:rPr lang="en-US" sz="3800" i="1" dirty="0">
+                <a:solidFill>
+                  <a:srgbClr val="00B0F0"/>
+                </a:solidFill>
+              </a:rPr>
+              <a:t>… end of .__init__ function …</a:t>
             </a:r>
           </a:p>
           <a:p>
@@ -9934,8 +10043,16 @@
               <a:buNone/>
             </a:pPr>
             <a:r>
-              <a:rPr lang="en-US" sz="9800" dirty="0"/>
-              <a:t>    def on_exit(self):</a:t>
+              <a:rPr lang="en-US" sz="3200" i="1" dirty="0">
+                <a:solidFill>
+                  <a:schemeClr val="accent4"/>
+                </a:solidFill>
+              </a:rPr>
+              <a:t>if</a:t>
+            </a:r>
+            <a:r>
+              <a:rPr lang="en-US" sz="3200" i="1" dirty="0"/>
+              <a:t> self.standalone:</a:t>
             </a:r>
           </a:p>
           <a:p>
@@ -9943,8 +10060,8 @@
               <a:buNone/>
             </a:pPr>
             <a:r>
-              <a:rPr lang="en-US" sz="9800" dirty="0"/>
-              <a:t>        """ Close down window on program exit</a:t>
+              <a:rPr lang="en-US" sz="3200" i="1" dirty="0"/>
+              <a:t>            atexit.register(self.on_exit)</a:t>
             </a:r>
           </a:p>
           <a:p>
@@ -9952,42 +10069,9 @@
               <a:buNone/>
             </a:pPr>
             <a:r>
-              <a:rPr lang="en-US" sz="9800" dirty="0"/>
-              <a:t>        """</a:t>
-            </a:r>
-          </a:p>
-          <a:p>
-            <a:pPr marL="0" indent="0">
-              <a:buNone/>
-            </a:pPr>
-            <a:r>
-              <a:rPr lang="en-US" sz="9800" dirty="0"/>
-              <a:t>        SlTrace.lg("Closing down Trace Control Window")</a:t>
-            </a:r>
-          </a:p>
-          <a:p>
-            <a:pPr marL="0" indent="0">
-              <a:buNone/>
-            </a:pPr>
-            <a:r>
-              <a:rPr lang="en-US" sz="9800" dirty="0"/>
-              <a:t>        self.delete_tc_window()</a:t>
-            </a:r>
-          </a:p>
-          <a:p>
-            <a:pPr marL="0" indent="0">
-              <a:buNone/>
-            </a:pPr>
-            <a:r>
-              <a:rPr lang="en-US" sz="9800" dirty="0"/>
-              <a:t>        </a:t>
-            </a:r>
-          </a:p>
-          <a:p>
-            <a:pPr marL="0" indent="0">
-              <a:buNone/>
-            </a:pPr>
-            <a:endParaRPr lang="en-US" sz="9800" dirty="0"/>
+              <a:rPr lang="en-US" sz="3200" i="1" dirty="0"/>
+              <a:t>            self.update_loop()</a:t>
+            </a:r>
           </a:p>
           <a:p>
             <a:pPr marL="0" indent="0">
@@ -10020,7 +10104,7 @@
           <a:p>
             <a:fld id="{A7119916-CD40-456D-ABE3-55F8822671F7}" type="datetime1">
               <a:rPr lang="en-US" smtClean="0"/>
-              <a:t>2/29/2020</a:t>
+              <a:t>3/3/2020</a:t>
             </a:fld>
             <a:endParaRPr lang="en-US" dirty="0"/>
           </a:p>
@@ -10078,6 +10162,607 @@
             <a:fld id="{6D22F896-40B5-4ADD-8801-0D06FADFA095}" type="slidenum">
               <a:rPr lang="en-US" smtClean="0"/>
               <a:t>17</a:t>
+            </a:fld>
+            <a:endParaRPr lang="en-US" dirty="0"/>
+          </a:p>
+        </p:txBody>
+      </p:sp>
+    </p:spTree>
+    <p:extLst>
+      <p:ext uri="{BB962C8B-B14F-4D97-AF65-F5344CB8AC3E}">
+        <p14:creationId xmlns:p14="http://schemas.microsoft.com/office/powerpoint/2010/main" val="3654383725"/>
+      </p:ext>
+    </p:extLst>
+  </p:cSld>
+  <p:clrMapOvr>
+    <a:masterClrMapping/>
+  </p:clrMapOvr>
+</p:sld>
+</file>
+
+<file path=ppt/slides/slide18.xml><?xml version="1.0" encoding="utf-8"?>
+<p:sld xmlns:a="http://schemas.openxmlformats.org/drawingml/2006/main" xmlns:r="http://schemas.openxmlformats.org/officeDocument/2006/relationships" xmlns:p="http://schemas.openxmlformats.org/presentationml/2006/main">
+  <p:cSld>
+    <p:spTree>
+      <p:nvGrpSpPr>
+        <p:cNvPr id="1" name=""/>
+        <p:cNvGrpSpPr/>
+        <p:nvPr/>
+      </p:nvGrpSpPr>
+      <p:grpSpPr>
+        <a:xfrm>
+          <a:off x="0" y="0"/>
+          <a:ext cx="0" cy="0"/>
+          <a:chOff x="0" y="0"/>
+          <a:chExt cx="0" cy="0"/>
+        </a:xfrm>
+      </p:grpSpPr>
+      <p:sp>
+        <p:nvSpPr>
+          <p:cNvPr id="2" name="Title 1">
+            <a:extLst>
+              <a:ext uri="{FF2B5EF4-FFF2-40B4-BE49-F238E27FC236}">
+                <a16:creationId xmlns:a16="http://schemas.microsoft.com/office/drawing/2014/main" id="{8D08E475-8774-49C6-80EF-5DA0E290005E}"/>
+              </a:ext>
+            </a:extLst>
+          </p:cNvPr>
+          <p:cNvSpPr>
+            <a:spLocks noGrp="1"/>
+          </p:cNvSpPr>
+          <p:nvPr>
+            <p:ph type="title"/>
+          </p:nvPr>
+        </p:nvSpPr>
+        <p:spPr/>
+        <p:txBody>
+          <a:bodyPr>
+            <a:normAutofit fontScale="90000"/>
+          </a:bodyPr>
+          <a:lstStyle/>
+          <a:p>
+            <a:r>
+              <a:rPr lang="en-US" dirty="0"/>
+              <a:t>TraceControlWindow</a:t>
+            </a:r>
+            <a:br>
+              <a:rPr lang="en-US" dirty="0"/>
+            </a:br>
+            <a:r>
+              <a:rPr lang="en-US" dirty="0"/>
+              <a:t>- trace_control_window.py - continued</a:t>
+            </a:r>
+            <a:br>
+              <a:rPr lang="en-US" dirty="0"/>
+            </a:br>
+            <a:br>
+              <a:rPr lang="en-US" dirty="0"/>
+            </a:br>
+            <a:endParaRPr lang="en-US" sz="2800" dirty="0"/>
+          </a:p>
+        </p:txBody>
+      </p:sp>
+      <p:sp>
+        <p:nvSpPr>
+          <p:cNvPr id="3" name="Content Placeholder 2">
+            <a:extLst>
+              <a:ext uri="{FF2B5EF4-FFF2-40B4-BE49-F238E27FC236}">
+                <a16:creationId xmlns:a16="http://schemas.microsoft.com/office/drawing/2014/main" id="{B075C7D9-58D0-4800-8D5F-90F9EC0CDF76}"/>
+              </a:ext>
+            </a:extLst>
+          </p:cNvPr>
+          <p:cNvSpPr>
+            <a:spLocks noGrp="1"/>
+          </p:cNvSpPr>
+          <p:nvPr>
+            <p:ph idx="1"/>
+          </p:nvPr>
+        </p:nvSpPr>
+        <p:spPr>
+          <a:xfrm>
+            <a:off x="321733" y="2160589"/>
+            <a:ext cx="10498667" cy="3880773"/>
+          </a:xfrm>
+        </p:spPr>
+        <p:txBody>
+          <a:bodyPr>
+            <a:normAutofit fontScale="25000" lnSpcReduction="20000"/>
+          </a:bodyPr>
+          <a:lstStyle/>
+          <a:p>
+            <a:pPr marL="0" indent="0">
+              <a:buNone/>
+            </a:pPr>
+            <a:r>
+              <a:rPr lang="en-US" sz="3800" dirty="0"/>
+              <a:t>        </a:t>
+            </a:r>
+          </a:p>
+          <a:p>
+            <a:pPr marL="0" indent="0">
+              <a:buNone/>
+            </a:pPr>
+            <a:r>
+              <a:rPr lang="en-US" sz="12800" dirty="0">
+                <a:solidFill>
+                  <a:schemeClr val="accent4"/>
+                </a:solidFill>
+              </a:rPr>
+              <a:t>def</a:t>
+            </a:r>
+            <a:r>
+              <a:rPr lang="en-US" sz="12800" dirty="0"/>
+              <a:t> </a:t>
+            </a:r>
+            <a:r>
+              <a:rPr lang="en-US" sz="12800" dirty="0">
+                <a:solidFill>
+                  <a:srgbClr val="0070C0"/>
+                </a:solidFill>
+              </a:rPr>
+              <a:t>update_loop</a:t>
+            </a:r>
+            <a:r>
+              <a:rPr lang="en-US" sz="12800" dirty="0"/>
+              <a:t>(self):</a:t>
+            </a:r>
+          </a:p>
+          <a:p>
+            <a:pPr marL="0" indent="0">
+              <a:buNone/>
+            </a:pPr>
+            <a:r>
+              <a:rPr lang="en-US" sz="12800" dirty="0"/>
+              <a:t>        """ continue repeated tk.update() calls</a:t>
+            </a:r>
+          </a:p>
+          <a:p>
+            <a:pPr marL="0" indent="0">
+              <a:buNone/>
+            </a:pPr>
+            <a:r>
+              <a:rPr lang="en-US" sz="12800" dirty="0"/>
+              <a:t>        to enable window operation</a:t>
+            </a:r>
+          </a:p>
+          <a:p>
+            <a:pPr marL="0" indent="0">
+              <a:buNone/>
+            </a:pPr>
+            <a:r>
+              <a:rPr lang="en-US" sz="12800" dirty="0"/>
+              <a:t>        """</a:t>
+            </a:r>
+          </a:p>
+          <a:p>
+            <a:pPr marL="0" indent="0">
+              <a:buNone/>
+            </a:pPr>
+            <a:r>
+              <a:rPr lang="en-US" sz="12800" dirty="0"/>
+              <a:t>        loop_time = 50          # Loop recall time (msec)</a:t>
+            </a:r>
+          </a:p>
+          <a:p>
+            <a:pPr marL="0" indent="0">
+              <a:buNone/>
+            </a:pPr>
+            <a:r>
+              <a:rPr lang="en-US" sz="12800" dirty="0"/>
+              <a:t>        self.tc_mw.update()	# Update tkinter stuff</a:t>
+            </a:r>
+          </a:p>
+          <a:p>
+            <a:pPr marL="0" indent="0">
+              <a:buNone/>
+            </a:pPr>
+            <a:r>
+              <a:rPr lang="en-US" sz="12800" dirty="0"/>
+              <a:t>        self.tc_mw.after(loop_time, self.update_loop)</a:t>
+            </a:r>
+          </a:p>
+          <a:p>
+            <a:pPr marL="0" indent="0">
+              <a:buNone/>
+            </a:pPr>
+            <a:endParaRPr lang="en-US" sz="9800" dirty="0"/>
+          </a:p>
+          <a:p>
+            <a:pPr marL="0" indent="0">
+              <a:buNone/>
+            </a:pPr>
+            <a:endParaRPr lang="en-US" sz="3600" dirty="0"/>
+          </a:p>
+        </p:txBody>
+      </p:sp>
+      <p:sp>
+        <p:nvSpPr>
+          <p:cNvPr id="4" name="Date Placeholder 3">
+            <a:extLst>
+              <a:ext uri="{FF2B5EF4-FFF2-40B4-BE49-F238E27FC236}">
+                <a16:creationId xmlns:a16="http://schemas.microsoft.com/office/drawing/2014/main" id="{FB1C9788-235F-4FA3-80F9-57B7CFC85782}"/>
+              </a:ext>
+            </a:extLst>
+          </p:cNvPr>
+          <p:cNvSpPr>
+            <a:spLocks noGrp="1"/>
+          </p:cNvSpPr>
+          <p:nvPr>
+            <p:ph type="dt" sz="half" idx="10"/>
+          </p:nvPr>
+        </p:nvSpPr>
+        <p:spPr/>
+        <p:txBody>
+          <a:bodyPr/>
+          <a:lstStyle/>
+          <a:p>
+            <a:fld id="{A7119916-CD40-456D-ABE3-55F8822671F7}" type="datetime1">
+              <a:rPr lang="en-US" smtClean="0"/>
+              <a:t>3/3/2020</a:t>
+            </a:fld>
+            <a:endParaRPr lang="en-US" dirty="0"/>
+          </a:p>
+        </p:txBody>
+      </p:sp>
+      <p:sp>
+        <p:nvSpPr>
+          <p:cNvPr id="5" name="Footer Placeholder 4">
+            <a:extLst>
+              <a:ext uri="{FF2B5EF4-FFF2-40B4-BE49-F238E27FC236}">
+                <a16:creationId xmlns:a16="http://schemas.microsoft.com/office/drawing/2014/main" id="{B3B9AA5A-31AA-4ACD-AE6F-0ACF711CE451}"/>
+              </a:ext>
+            </a:extLst>
+          </p:cNvPr>
+          <p:cNvSpPr>
+            <a:spLocks noGrp="1"/>
+          </p:cNvSpPr>
+          <p:nvPr>
+            <p:ph type="ftr" sz="quarter" idx="11"/>
+          </p:nvPr>
+        </p:nvSpPr>
+        <p:spPr/>
+        <p:txBody>
+          <a:bodyPr/>
+          <a:lstStyle/>
+          <a:p>
+            <a:r>
+              <a:rPr lang="en-US" dirty="0"/>
+              <a:t>raysmith@alum.mit.edu</a:t>
+            </a:r>
+          </a:p>
+        </p:txBody>
+      </p:sp>
+      <p:sp>
+        <p:nvSpPr>
+          <p:cNvPr id="6" name="Slide Number Placeholder 5">
+            <a:extLst>
+              <a:ext uri="{FF2B5EF4-FFF2-40B4-BE49-F238E27FC236}">
+                <a16:creationId xmlns:a16="http://schemas.microsoft.com/office/drawing/2014/main" id="{976EFE2A-DC71-4119-8554-D99AD8A23973}"/>
+              </a:ext>
+            </a:extLst>
+          </p:cNvPr>
+          <p:cNvSpPr>
+            <a:spLocks noGrp="1"/>
+          </p:cNvSpPr>
+          <p:nvPr>
+            <p:ph type="sldNum" sz="quarter" idx="12"/>
+          </p:nvPr>
+        </p:nvSpPr>
+        <p:spPr/>
+        <p:txBody>
+          <a:bodyPr/>
+          <a:lstStyle/>
+          <a:p>
+            <a:fld id="{6D22F896-40B5-4ADD-8801-0D06FADFA095}" type="slidenum">
+              <a:rPr lang="en-US" smtClean="0"/>
+              <a:t>18</a:t>
+            </a:fld>
+            <a:endParaRPr lang="en-US" dirty="0"/>
+          </a:p>
+        </p:txBody>
+      </p:sp>
+    </p:spTree>
+    <p:extLst>
+      <p:ext uri="{BB962C8B-B14F-4D97-AF65-F5344CB8AC3E}">
+        <p14:creationId xmlns:p14="http://schemas.microsoft.com/office/powerpoint/2010/main" val="3679562782"/>
+      </p:ext>
+    </p:extLst>
+  </p:cSld>
+  <p:clrMapOvr>
+    <a:masterClrMapping/>
+  </p:clrMapOvr>
+</p:sld>
+</file>
+
+<file path=ppt/slides/slide19.xml><?xml version="1.0" encoding="utf-8"?>
+<p:sld xmlns:a="http://schemas.openxmlformats.org/drawingml/2006/main" xmlns:r="http://schemas.openxmlformats.org/officeDocument/2006/relationships" xmlns:p="http://schemas.openxmlformats.org/presentationml/2006/main">
+  <p:cSld>
+    <p:spTree>
+      <p:nvGrpSpPr>
+        <p:cNvPr id="1" name=""/>
+        <p:cNvGrpSpPr/>
+        <p:nvPr/>
+      </p:nvGrpSpPr>
+      <p:grpSpPr>
+        <a:xfrm>
+          <a:off x="0" y="0"/>
+          <a:ext cx="0" cy="0"/>
+          <a:chOff x="0" y="0"/>
+          <a:chExt cx="0" cy="0"/>
+        </a:xfrm>
+      </p:grpSpPr>
+      <p:sp>
+        <p:nvSpPr>
+          <p:cNvPr id="2" name="Title 1">
+            <a:extLst>
+              <a:ext uri="{FF2B5EF4-FFF2-40B4-BE49-F238E27FC236}">
+                <a16:creationId xmlns:a16="http://schemas.microsoft.com/office/drawing/2014/main" id="{8D08E475-8774-49C6-80EF-5DA0E290005E}"/>
+              </a:ext>
+            </a:extLst>
+          </p:cNvPr>
+          <p:cNvSpPr>
+            <a:spLocks noGrp="1"/>
+          </p:cNvSpPr>
+          <p:nvPr>
+            <p:ph type="title"/>
+          </p:nvPr>
+        </p:nvSpPr>
+        <p:spPr/>
+        <p:txBody>
+          <a:bodyPr>
+            <a:normAutofit fontScale="90000"/>
+          </a:bodyPr>
+          <a:lstStyle/>
+          <a:p>
+            <a:r>
+              <a:rPr lang="en-US" dirty="0"/>
+              <a:t>TraceControlWindow</a:t>
+            </a:r>
+            <a:br>
+              <a:rPr lang="en-US" dirty="0"/>
+            </a:br>
+            <a:r>
+              <a:rPr lang="en-US" dirty="0"/>
+              <a:t>- trace_control_window.py - continued</a:t>
+            </a:r>
+            <a:br>
+              <a:rPr lang="en-US" dirty="0"/>
+            </a:br>
+            <a:br>
+              <a:rPr lang="en-US" dirty="0"/>
+            </a:br>
+            <a:endParaRPr lang="en-US" sz="2800" dirty="0"/>
+          </a:p>
+        </p:txBody>
+      </p:sp>
+      <p:sp>
+        <p:nvSpPr>
+          <p:cNvPr id="3" name="Content Placeholder 2">
+            <a:extLst>
+              <a:ext uri="{FF2B5EF4-FFF2-40B4-BE49-F238E27FC236}">
+                <a16:creationId xmlns:a16="http://schemas.microsoft.com/office/drawing/2014/main" id="{B075C7D9-58D0-4800-8D5F-90F9EC0CDF76}"/>
+              </a:ext>
+            </a:extLst>
+          </p:cNvPr>
+          <p:cNvSpPr>
+            <a:spLocks noGrp="1"/>
+          </p:cNvSpPr>
+          <p:nvPr>
+            <p:ph idx="1"/>
+          </p:nvPr>
+        </p:nvSpPr>
+        <p:spPr>
+          <a:xfrm>
+            <a:off x="440267" y="2160589"/>
+            <a:ext cx="10126133" cy="3880773"/>
+          </a:xfrm>
+        </p:spPr>
+        <p:txBody>
+          <a:bodyPr>
+            <a:normAutofit fontScale="32500" lnSpcReduction="20000"/>
+          </a:bodyPr>
+          <a:lstStyle/>
+          <a:p>
+            <a:pPr marL="0" indent="0">
+              <a:buNone/>
+            </a:pPr>
+            <a:r>
+              <a:rPr lang="en-US" sz="3800" dirty="0"/>
+              <a:t>        </a:t>
+            </a:r>
+          </a:p>
+          <a:p>
+            <a:pPr marL="0" indent="0">
+              <a:buNone/>
+            </a:pPr>
+            <a:r>
+              <a:rPr lang="en-US" sz="9800" dirty="0"/>
+              <a:t>    </a:t>
+            </a:r>
+            <a:r>
+              <a:rPr lang="en-US" sz="9800" dirty="0">
+                <a:solidFill>
+                  <a:schemeClr val="accent4"/>
+                </a:solidFill>
+              </a:rPr>
+              <a:t>def</a:t>
+            </a:r>
+            <a:r>
+              <a:rPr lang="en-US" sz="9800" dirty="0"/>
+              <a:t> </a:t>
+            </a:r>
+            <a:r>
+              <a:rPr lang="en-US" sz="9800" dirty="0">
+                <a:solidFill>
+                  <a:srgbClr val="00B0F0"/>
+                </a:solidFill>
+              </a:rPr>
+              <a:t>on_exit</a:t>
+            </a:r>
+            <a:r>
+              <a:rPr lang="en-US" sz="9800" dirty="0"/>
+              <a:t>(self):</a:t>
+            </a:r>
+          </a:p>
+          <a:p>
+            <a:pPr marL="0" indent="0">
+              <a:buNone/>
+            </a:pPr>
+            <a:r>
+              <a:rPr lang="en-US" sz="9800" dirty="0"/>
+              <a:t>        </a:t>
+            </a:r>
+            <a:r>
+              <a:rPr lang="en-US" sz="9800" dirty="0">
+                <a:solidFill>
+                  <a:schemeClr val="accent2"/>
+                </a:solidFill>
+              </a:rPr>
+              <a:t>""" Close down window on program exit</a:t>
+            </a:r>
+          </a:p>
+          <a:p>
+            <a:pPr marL="0" indent="0">
+              <a:buNone/>
+            </a:pPr>
+            <a:r>
+              <a:rPr lang="en-US" sz="9800" dirty="0">
+                <a:solidFill>
+                  <a:schemeClr val="accent2"/>
+                </a:solidFill>
+              </a:rPr>
+              <a:t>        """</a:t>
+            </a:r>
+          </a:p>
+          <a:p>
+            <a:pPr marL="0" indent="0">
+              <a:buNone/>
+            </a:pPr>
+            <a:r>
+              <a:rPr lang="en-US" sz="9800" dirty="0"/>
+              <a:t>        SlTrace.lg(</a:t>
+            </a:r>
+            <a:r>
+              <a:rPr lang="en-US" sz="9800" dirty="0">
+                <a:solidFill>
+                  <a:schemeClr val="accent2"/>
+                </a:solidFill>
+              </a:rPr>
+              <a:t>"Closing down Trace Control Window")</a:t>
+            </a:r>
+          </a:p>
+          <a:p>
+            <a:pPr marL="0" indent="0">
+              <a:buNone/>
+            </a:pPr>
+            <a:r>
+              <a:rPr lang="en-US" sz="9800" dirty="0"/>
+              <a:t>        self.delete_tc_window()</a:t>
+            </a:r>
+          </a:p>
+          <a:p>
+            <a:pPr marL="0" indent="0">
+              <a:buNone/>
+            </a:pPr>
+            <a:r>
+              <a:rPr lang="en-US" sz="9800" dirty="0"/>
+              <a:t>        </a:t>
+            </a:r>
+          </a:p>
+          <a:p>
+            <a:pPr marL="0" indent="0">
+              <a:buNone/>
+            </a:pPr>
+            <a:endParaRPr lang="en-US" sz="9800" dirty="0"/>
+          </a:p>
+          <a:p>
+            <a:pPr marL="0" indent="0">
+              <a:buNone/>
+            </a:pPr>
+            <a:endParaRPr lang="en-US" sz="3600" dirty="0"/>
+          </a:p>
+        </p:txBody>
+      </p:sp>
+      <p:sp>
+        <p:nvSpPr>
+          <p:cNvPr id="4" name="Date Placeholder 3">
+            <a:extLst>
+              <a:ext uri="{FF2B5EF4-FFF2-40B4-BE49-F238E27FC236}">
+                <a16:creationId xmlns:a16="http://schemas.microsoft.com/office/drawing/2014/main" id="{FB1C9788-235F-4FA3-80F9-57B7CFC85782}"/>
+              </a:ext>
+            </a:extLst>
+          </p:cNvPr>
+          <p:cNvSpPr>
+            <a:spLocks noGrp="1"/>
+          </p:cNvSpPr>
+          <p:nvPr>
+            <p:ph type="dt" sz="half" idx="10"/>
+          </p:nvPr>
+        </p:nvSpPr>
+        <p:spPr/>
+        <p:txBody>
+          <a:bodyPr/>
+          <a:lstStyle/>
+          <a:p>
+            <a:fld id="{A7119916-CD40-456D-ABE3-55F8822671F7}" type="datetime1">
+              <a:rPr lang="en-US" smtClean="0"/>
+              <a:t>3/3/2020</a:t>
+            </a:fld>
+            <a:endParaRPr lang="en-US" dirty="0"/>
+          </a:p>
+        </p:txBody>
+      </p:sp>
+      <p:sp>
+        <p:nvSpPr>
+          <p:cNvPr id="5" name="Footer Placeholder 4">
+            <a:extLst>
+              <a:ext uri="{FF2B5EF4-FFF2-40B4-BE49-F238E27FC236}">
+                <a16:creationId xmlns:a16="http://schemas.microsoft.com/office/drawing/2014/main" id="{B3B9AA5A-31AA-4ACD-AE6F-0ACF711CE451}"/>
+              </a:ext>
+            </a:extLst>
+          </p:cNvPr>
+          <p:cNvSpPr>
+            <a:spLocks noGrp="1"/>
+          </p:cNvSpPr>
+          <p:nvPr>
+            <p:ph type="ftr" sz="quarter" idx="11"/>
+          </p:nvPr>
+        </p:nvSpPr>
+        <p:spPr/>
+        <p:txBody>
+          <a:bodyPr/>
+          <a:lstStyle/>
+          <a:p>
+            <a:r>
+              <a:rPr lang="en-US" dirty="0"/>
+              <a:t>raysmith@alum.mit.edu</a:t>
+            </a:r>
+          </a:p>
+        </p:txBody>
+      </p:sp>
+      <p:sp>
+        <p:nvSpPr>
+          <p:cNvPr id="6" name="Slide Number Placeholder 5">
+            <a:extLst>
+              <a:ext uri="{FF2B5EF4-FFF2-40B4-BE49-F238E27FC236}">
+                <a16:creationId xmlns:a16="http://schemas.microsoft.com/office/drawing/2014/main" id="{976EFE2A-DC71-4119-8554-D99AD8A23973}"/>
+              </a:ext>
+            </a:extLst>
+          </p:cNvPr>
+          <p:cNvSpPr>
+            <a:spLocks noGrp="1"/>
+          </p:cNvSpPr>
+          <p:nvPr>
+            <p:ph type="sldNum" sz="quarter" idx="12"/>
+          </p:nvPr>
+        </p:nvSpPr>
+        <p:spPr/>
+        <p:txBody>
+          <a:bodyPr/>
+          <a:lstStyle/>
+          <a:p>
+            <a:fld id="{6D22F896-40B5-4ADD-8801-0D06FADFA095}" type="slidenum">
+              <a:rPr lang="en-US" smtClean="0"/>
+              <a:t>19</a:t>
             </a:fld>
             <a:endParaRPr lang="en-US" dirty="0"/>
           </a:p>
@@ -10136,7 +10821,7 @@
           <a:p>
             <a:r>
               <a:rPr lang="en-US" dirty="0"/>
-              <a:t>Why Logging</a:t>
+              <a:t>What is Logging? Tracing?</a:t>
             </a:r>
           </a:p>
         </p:txBody>
@@ -10164,19 +10849,19 @@
           <a:p>
             <a:r>
               <a:rPr lang="en-US" sz="3600" dirty="0"/>
-              <a:t>Track program history</a:t>
+              <a:t>Logging – Recorded program output each run</a:t>
             </a:r>
           </a:p>
           <a:p>
             <a:r>
               <a:rPr lang="en-US" sz="3600" dirty="0"/>
-              <a:t>Record Progress / Change</a:t>
+              <a:t>Tracing – Selective output based on conditions</a:t>
             </a:r>
           </a:p>
           <a:p>
             <a:r>
               <a:rPr lang="en-US" sz="3600" dirty="0"/>
-              <a:t>Measure Performance</a:t>
+              <a:t>Tracing - appears in the display + logging file</a:t>
             </a:r>
           </a:p>
           <a:p>
@@ -10207,7 +10892,7 @@
           <a:p>
             <a:fld id="{A7119916-CD40-456D-ABE3-55F8822671F7}" type="datetime1">
               <a:rPr lang="en-US" smtClean="0"/>
-              <a:t>2/29/2020</a:t>
+              <a:t>3/3/2020</a:t>
             </a:fld>
             <a:endParaRPr lang="en-US" dirty="0"/>
           </a:p>
@@ -10273,7 +10958,7 @@
     </p:spTree>
     <p:extLst>
       <p:ext uri="{BB962C8B-B14F-4D97-AF65-F5344CB8AC3E}">
-        <p14:creationId xmlns:p14="http://schemas.microsoft.com/office/powerpoint/2010/main" val="2785792364"/>
+        <p14:creationId xmlns:p14="http://schemas.microsoft.com/office/powerpoint/2010/main" val="3286796356"/>
       </p:ext>
     </p:extLst>
   </p:cSld>
@@ -10323,7 +11008,7 @@
           <a:p>
             <a:r>
               <a:rPr lang="en-US" dirty="0"/>
-              <a:t>Why Tracing ?</a:t>
+              <a:t>Why Logging ?</a:t>
             </a:r>
           </a:p>
         </p:txBody>
@@ -10351,19 +11036,19 @@
           <a:p>
             <a:r>
               <a:rPr lang="en-US" sz="3600" dirty="0"/>
-              <a:t>Understand the program in progress</a:t>
+              <a:t>Track program history</a:t>
             </a:r>
           </a:p>
           <a:p>
             <a:r>
               <a:rPr lang="en-US" sz="3600" dirty="0"/>
-              <a:t>Measure Detailed Performance</a:t>
+              <a:t>Record Progress / Change</a:t>
             </a:r>
           </a:p>
           <a:p>
             <a:r>
               <a:rPr lang="en-US" sz="3600" dirty="0"/>
-              <a:t>As old as "if … print(…)"</a:t>
+              <a:t>Measure Performance</a:t>
             </a:r>
           </a:p>
           <a:p>
@@ -10394,7 +11079,7 @@
           <a:p>
             <a:fld id="{A7119916-CD40-456D-ABE3-55F8822671F7}" type="datetime1">
               <a:rPr lang="en-US" smtClean="0"/>
-              <a:t>2/29/2020</a:t>
+              <a:t>3/3/2020</a:t>
             </a:fld>
             <a:endParaRPr lang="en-US" dirty="0"/>
           </a:p>
@@ -10460,7 +11145,7 @@
     </p:spTree>
     <p:extLst>
       <p:ext uri="{BB962C8B-B14F-4D97-AF65-F5344CB8AC3E}">
-        <p14:creationId xmlns:p14="http://schemas.microsoft.com/office/powerpoint/2010/main" val="997601313"/>
+        <p14:creationId xmlns:p14="http://schemas.microsoft.com/office/powerpoint/2010/main" val="2785792364"/>
       </p:ext>
     </p:extLst>
   </p:cSld>
@@ -10510,7 +11195,7 @@
           <a:p>
             <a:r>
               <a:rPr lang="en-US" dirty="0"/>
-              <a:t>Problems / Drawbacks </a:t>
+              <a:t>Why Tracing ?</a:t>
             </a:r>
           </a:p>
         </p:txBody>
@@ -10533,50 +11218,36 @@
         </p:nvSpPr>
         <p:spPr/>
         <p:txBody>
-          <a:bodyPr>
-            <a:normAutofit fontScale="92500"/>
-          </a:bodyPr>
-          <a:lstStyle/>
-          <a:p>
-            <a:pPr marL="857250" lvl="1" indent="-457200"/>
-            <a:r>
-              <a:rPr lang="en-US" sz="3400" dirty="0"/>
-              <a:t>Extra programmer work</a:t>
-            </a:r>
-          </a:p>
-          <a:p>
-            <a:pPr marL="857250" lvl="1" indent="-457200"/>
-            <a:r>
-              <a:rPr lang="en-US" sz="3400" dirty="0"/>
-              <a:t>Slows down program execution</a:t>
-            </a:r>
-          </a:p>
-          <a:p>
-            <a:pPr marL="857250" lvl="1" indent="-457200"/>
-            <a:r>
-              <a:rPr lang="en-US" sz="3400" dirty="0"/>
-              <a:t>Must be done ahead of time</a:t>
-            </a:r>
-          </a:p>
-          <a:p>
-            <a:pPr marL="857250" lvl="1" indent="-457200"/>
-            <a:r>
-              <a:rPr lang="en-US" sz="3400" dirty="0"/>
-              <a:t>Must be removed</a:t>
-            </a:r>
-          </a:p>
-          <a:p>
-            <a:pPr marL="857250" lvl="1" indent="-457200"/>
-            <a:r>
-              <a:rPr lang="en-US" sz="3400" dirty="0"/>
-              <a:t>Gone before "real problems" - production</a:t>
-            </a:r>
-          </a:p>
-          <a:p>
-            <a:pPr marL="857250" lvl="1" indent="-457200"/>
-            <a:r>
-              <a:rPr lang="en-US" sz="3400" dirty="0"/>
-              <a:t>Clutters up display / output</a:t>
+          <a:bodyPr/>
+          <a:lstStyle/>
+          <a:p>
+            <a:r>
+              <a:rPr lang="en-US" sz="3600" dirty="0"/>
+              <a:t>Understand the program in progress</a:t>
+            </a:r>
+          </a:p>
+          <a:p>
+            <a:r>
+              <a:rPr lang="en-US" sz="3600" dirty="0"/>
+              <a:t>Measure Detailed Performance</a:t>
+            </a:r>
+          </a:p>
+          <a:p>
+            <a:r>
+              <a:rPr lang="en-US" sz="3600" dirty="0"/>
+              <a:t>As old as "</a:t>
+            </a:r>
+            <a:r>
+              <a:rPr lang="en-US" sz="3600" dirty="0">
+                <a:solidFill>
+                  <a:schemeClr val="accent4"/>
+                </a:solidFill>
+              </a:rPr>
+              <a:t>if</a:t>
+            </a:r>
+            <a:r>
+              <a:rPr lang="en-US" sz="3600" dirty="0"/>
+              <a:t> … print(…)"</a:t>
             </a:r>
           </a:p>
           <a:p>
@@ -10607,7 +11278,7 @@
           <a:p>
             <a:fld id="{A7119916-CD40-456D-ABE3-55F8822671F7}" type="datetime1">
               <a:rPr lang="en-US" smtClean="0"/>
-              <a:t>2/29/2020</a:t>
+              <a:t>3/3/2020</a:t>
             </a:fld>
             <a:endParaRPr lang="en-US" dirty="0"/>
           </a:p>
@@ -10673,7 +11344,7 @@
     </p:spTree>
     <p:extLst>
       <p:ext uri="{BB962C8B-B14F-4D97-AF65-F5344CB8AC3E}">
-        <p14:creationId xmlns:p14="http://schemas.microsoft.com/office/powerpoint/2010/main" val="2374185351"/>
+        <p14:creationId xmlns:p14="http://schemas.microsoft.com/office/powerpoint/2010/main" val="997601313"/>
       </p:ext>
     </p:extLst>
   </p:cSld>
@@ -10723,7 +11394,7 @@
           <a:p>
             <a:r>
               <a:rPr lang="en-US" dirty="0"/>
-              <a:t>Addressing the Problems / Drawbacks </a:t>
+              <a:t>Problems / Drawbacks </a:t>
             </a:r>
           </a:p>
         </p:txBody>
@@ -10747,35 +11418,49 @@
         <p:spPr/>
         <p:txBody>
           <a:bodyPr>
-            <a:normAutofit/>
+            <a:normAutofit fontScale="92500"/>
           </a:bodyPr>
           <a:lstStyle/>
           <a:p>
             <a:pPr marL="857250" lvl="1" indent="-457200"/>
             <a:r>
               <a:rPr lang="en-US" sz="3400" dirty="0"/>
-              <a:t>Making it easy (easier)</a:t>
+              <a:t>Extra programmer work</a:t>
             </a:r>
           </a:p>
           <a:p>
             <a:pPr marL="857250" lvl="1" indent="-457200"/>
             <a:r>
               <a:rPr lang="en-US" sz="3400" dirty="0"/>
-              <a:t>Selective execution / display</a:t>
+              <a:t>Slows down program execution</a:t>
             </a:r>
           </a:p>
           <a:p>
             <a:pPr marL="857250" lvl="1" indent="-457200"/>
             <a:r>
               <a:rPr lang="en-US" sz="3400" dirty="0"/>
-              <a:t>Provide separate output</a:t>
+              <a:t>Must be done ahead of time</a:t>
             </a:r>
           </a:p>
           <a:p>
             <a:pPr marL="857250" lvl="1" indent="-457200"/>
             <a:r>
               <a:rPr lang="en-US" sz="3400" dirty="0"/>
-              <a:t>Support in the production code</a:t>
+              <a:t>Must be removed</a:t>
+            </a:r>
+          </a:p>
+          <a:p>
+            <a:pPr marL="857250" lvl="1" indent="-457200"/>
+            <a:r>
+              <a:rPr lang="en-US" sz="3400" dirty="0"/>
+              <a:t>Gone before "real problems" - production</a:t>
+            </a:r>
+          </a:p>
+          <a:p>
+            <a:pPr marL="857250" lvl="1" indent="-457200"/>
+            <a:r>
+              <a:rPr lang="en-US" sz="3400" dirty="0"/>
+              <a:t>Clutters up display / output</a:t>
             </a:r>
           </a:p>
           <a:p>
@@ -10806,7 +11491,7 @@
           <a:p>
             <a:fld id="{A7119916-CD40-456D-ABE3-55F8822671F7}" type="datetime1">
               <a:rPr lang="en-US" smtClean="0"/>
-              <a:t>2/29/2020</a:t>
+              <a:t>3/3/2020</a:t>
             </a:fld>
             <a:endParaRPr lang="en-US" dirty="0"/>
           </a:p>
@@ -10872,7 +11557,7 @@
     </p:spTree>
     <p:extLst>
       <p:ext uri="{BB962C8B-B14F-4D97-AF65-F5344CB8AC3E}">
-        <p14:creationId xmlns:p14="http://schemas.microsoft.com/office/powerpoint/2010/main" val="1606326301"/>
+        <p14:creationId xmlns:p14="http://schemas.microsoft.com/office/powerpoint/2010/main" val="2374185351"/>
       </p:ext>
     </p:extLst>
   </p:cSld>
@@ -10915,61 +11600,15 @@
             <p:ph type="title"/>
           </p:nvPr>
         </p:nvSpPr>
-        <p:spPr>
-          <a:xfrm>
-            <a:off x="256479" y="609600"/>
-            <a:ext cx="9556594" cy="1320800"/>
-          </a:xfrm>
-        </p:spPr>
-        <p:txBody>
-          <a:bodyPr>
-            <a:normAutofit fontScale="90000"/>
-          </a:bodyPr>
+        <p:spPr/>
+        <p:txBody>
+          <a:bodyPr/>
           <a:lstStyle/>
           <a:p>
             <a:r>
               <a:rPr lang="en-US" dirty="0"/>
-              <a:t>SelectTrace class -  </a:t>
-            </a:r>
-            <a:r>
-              <a:rPr lang="en-US" sz="2200" dirty="0">
-                <a:solidFill>
-                  <a:srgbClr val="00B0F0"/>
-                </a:solidFill>
-              </a:rPr>
-              <a:t>(</a:t>
-            </a:r>
-            <a:r>
-              <a:rPr lang="en-US" sz="3100" dirty="0">
-                <a:solidFill>
-                  <a:srgbClr val="00B0F0"/>
-                </a:solidFill>
-              </a:rPr>
-              <a:t>GitHub raysmith619/resource_lib</a:t>
-            </a:r>
-            <a:r>
-              <a:rPr lang="en-US" sz="2200" dirty="0">
-                <a:solidFill>
-                  <a:srgbClr val="00B0F0"/>
-                </a:solidFill>
-              </a:rPr>
-              <a:t>)</a:t>
-            </a:r>
-            <a:br>
-              <a:rPr lang="en-US" sz="2200" dirty="0">
-                <a:solidFill>
-                  <a:srgbClr val="00B0F0"/>
-                </a:solidFill>
-              </a:rPr>
-            </a:br>
-            <a:r>
-              <a:rPr lang="en-US" dirty="0"/>
-              <a:t>Output/Display - Features</a:t>
-            </a:r>
-            <a:br>
-              <a:rPr lang="en-US" dirty="0"/>
-            </a:br>
-            <a:endParaRPr lang="en-US" sz="2800" dirty="0"/>
+              <a:t>Addressing the Problems / Drawbacks </a:t>
+            </a:r>
           </a:p>
         </p:txBody>
       </p:sp>
@@ -10996,46 +11635,34 @@
           </a:bodyPr>
           <a:lstStyle/>
           <a:p>
-            <a:pPr lvl="1"/>
-            <a:r>
-              <a:rPr lang="en-US" sz="2800" dirty="0"/>
-              <a:t>Dual output to log file and STDOUT (screen)</a:t>
-            </a:r>
-          </a:p>
-          <a:p>
-            <a:pPr lvl="1"/>
-            <a:r>
-              <a:rPr lang="en-US" sz="2800" dirty="0"/>
-              <a:t>Time stamped output to log file</a:t>
-            </a:r>
-          </a:p>
-          <a:p>
-            <a:pPr lvl="2"/>
-            <a:r>
-              <a:rPr lang="en-US" sz="2800" dirty="0"/>
-              <a:t>Timestamp is optional to Display</a:t>
-            </a:r>
-          </a:p>
-          <a:p>
-            <a:pPr lvl="2"/>
-            <a:r>
-              <a:rPr lang="en-US" sz="2800" dirty="0"/>
-              <a:t>Resolution is adjustable (default Seconds)</a:t>
-            </a:r>
-          </a:p>
-          <a:p>
-            <a:pPr lvl="1"/>
-            <a:r>
-              <a:rPr lang="en-US" sz="2800" dirty="0"/>
-              <a:t>Selective tracing (based on flag level)</a:t>
-            </a:r>
-          </a:p>
-          <a:p>
-            <a:pPr lvl="1"/>
-            <a:r>
-              <a:rPr lang="en-US" sz="2800" dirty="0"/>
-              <a:t>Levels persist between program runs</a:t>
-            </a:r>
+            <a:pPr marL="857250" lvl="1" indent="-457200"/>
+            <a:r>
+              <a:rPr lang="en-US" sz="3400" dirty="0"/>
+              <a:t>Making it easy (easier)</a:t>
+            </a:r>
+          </a:p>
+          <a:p>
+            <a:pPr marL="857250" lvl="1" indent="-457200"/>
+            <a:r>
+              <a:rPr lang="en-US" sz="3400" dirty="0"/>
+              <a:t>Selective execution / display</a:t>
+            </a:r>
+          </a:p>
+          <a:p>
+            <a:pPr marL="857250" lvl="1" indent="-457200"/>
+            <a:r>
+              <a:rPr lang="en-US" sz="3400" dirty="0"/>
+              <a:t>Provide separate output</a:t>
+            </a:r>
+          </a:p>
+          <a:p>
+            <a:pPr marL="857250" lvl="1" indent="-457200"/>
+            <a:r>
+              <a:rPr lang="en-US" sz="3400" dirty="0"/>
+              <a:t>Support in the production code</a:t>
+            </a:r>
+          </a:p>
+          <a:p>
             <a:endParaRPr lang="en-US" sz="3600" dirty="0"/>
           </a:p>
         </p:txBody>
@@ -11063,7 +11690,7 @@
           <a:p>
             <a:fld id="{A7119916-CD40-456D-ABE3-55F8822671F7}" type="datetime1">
               <a:rPr lang="en-US" smtClean="0"/>
-              <a:t>2/29/2020</a:t>
+              <a:t>3/3/2020</a:t>
             </a:fld>
             <a:endParaRPr lang="en-US" dirty="0"/>
           </a:p>
@@ -11129,7 +11756,7 @@
     </p:spTree>
     <p:extLst>
       <p:ext uri="{BB962C8B-B14F-4D97-AF65-F5344CB8AC3E}">
-        <p14:creationId xmlns:p14="http://schemas.microsoft.com/office/powerpoint/2010/main" val="1737207891"/>
+        <p14:creationId xmlns:p14="http://schemas.microsoft.com/office/powerpoint/2010/main" val="1606326301"/>
       </p:ext>
     </p:extLst>
   </p:cSld>
@@ -11172,27 +11799,65 @@
             <p:ph type="title"/>
           </p:nvPr>
         </p:nvSpPr>
-        <p:spPr/>
+        <p:spPr>
+          <a:xfrm>
+            <a:off x="243527" y="571893"/>
+            <a:ext cx="9464281" cy="1320800"/>
+          </a:xfrm>
+        </p:spPr>
         <p:txBody>
           <a:bodyPr>
             <a:normAutofit fontScale="90000"/>
           </a:bodyPr>
           <a:lstStyle/>
           <a:p>
+            <a:pPr algn="ctr"/>
             <a:r>
               <a:rPr lang="en-US" dirty="0"/>
-              <a:t>SelectTrace class</a:t>
+              <a:t>SelectTrace class -  </a:t>
+            </a:r>
+            <a:r>
+              <a:rPr lang="en-US" sz="2200" dirty="0">
+                <a:solidFill>
+                  <a:srgbClr val="00B0F0"/>
+                </a:solidFill>
+              </a:rPr>
+              <a:t>(</a:t>
+            </a:r>
+            <a:r>
+              <a:rPr lang="en-US" sz="3100" dirty="0">
+                <a:solidFill>
+                  <a:srgbClr val="00B0F0"/>
+                </a:solidFill>
+              </a:rPr>
+              <a:t>GitHub raysmith619/resource_lib</a:t>
+            </a:r>
+            <a:r>
+              <a:rPr lang="en-US" sz="2200" dirty="0">
+                <a:solidFill>
+                  <a:srgbClr val="00B0F0"/>
+                </a:solidFill>
+              </a:rPr>
+              <a:t>)</a:t>
             </a:r>
             <a:br>
+              <a:rPr lang="en-US" sz="2200" dirty="0">
+                <a:solidFill>
+                  <a:srgbClr val="00B0F0"/>
+                </a:solidFill>
+              </a:rPr>
+            </a:br>
+            <a:br>
+              <a:rPr lang="en-US" sz="2200" dirty="0">
+                <a:solidFill>
+                  <a:srgbClr val="00B0F0"/>
+                </a:solidFill>
+              </a:rPr>
+            </a:br>
+            <a:r>
               <a:rPr lang="en-US" dirty="0"/>
-            </a:br>
-            <a:r>
-              <a:rPr lang="en-US" dirty="0"/>
-              <a:t>Logging File Features</a:t>
-            </a:r>
-            <a:br>
-              <a:rPr lang="en-US" dirty="0"/>
-            </a:br>
+              <a:t>DEMO</a:t>
+            </a:r>
             <a:endParaRPr lang="en-US" sz="2800" dirty="0"/>
           </a:p>
         </p:txBody>
@@ -11213,72 +11878,120 @@
             <p:ph idx="1"/>
           </p:nvPr>
         </p:nvSpPr>
-        <p:spPr/>
+        <p:spPr>
+          <a:xfrm>
+            <a:off x="677334" y="2160589"/>
+            <a:ext cx="8596668" cy="4042248"/>
+          </a:xfrm>
+        </p:spPr>
         <p:txBody>
           <a:bodyPr>
             <a:normAutofit/>
           </a:bodyPr>
           <a:lstStyle/>
           <a:p>
-            <a:pPr lvl="1"/>
-            <a:r>
-              <a:rPr lang="en-US" sz="3200" dirty="0"/>
-              <a:t>Automatic Creation</a:t>
-            </a:r>
-          </a:p>
-          <a:p>
-            <a:pPr lvl="1"/>
-            <a:r>
-              <a:rPr lang="en-US" sz="3200" dirty="0"/>
-              <a:t>Automatic log file naming</a:t>
-            </a:r>
-          </a:p>
-          <a:p>
-            <a:pPr lvl="1"/>
-            <a:r>
-              <a:rPr lang="en-US" sz="3200" dirty="0"/>
-              <a:t>Time stamped log file name</a:t>
-            </a:r>
-          </a:p>
-          <a:p>
-            <a:pPr lvl="2"/>
-            <a:r>
-              <a:rPr lang="en-US" sz="2800" b="1" dirty="0"/>
-              <a:t>log/</a:t>
-            </a:r>
-            <a:r>
-              <a:rPr lang="en-US" sz="2800" i="1" dirty="0"/>
-              <a:t>pgm_base_name</a:t>
+            <a:pPr marL="457200" lvl="1" indent="0">
+              <a:buNone/>
+            </a:pPr>
+            <a:r>
+              <a:rPr lang="en-US" sz="2800" dirty="0">
+                <a:solidFill>
+                  <a:srgbClr val="00B0F0"/>
+                </a:solidFill>
+              </a:rPr>
+              <a:t>From Python source file …</a:t>
+            </a:r>
+          </a:p>
+          <a:p>
+            <a:pPr marL="457200" lvl="1" indent="0">
+              <a:buNone/>
+            </a:pPr>
+            <a:r>
+              <a:rPr lang="en-US" sz="2800" dirty="0">
+                <a:solidFill>
+                  <a:schemeClr val="accent4"/>
+                </a:solidFill>
+              </a:rPr>
+              <a:t>from</a:t>
             </a:r>
             <a:r>
               <a:rPr lang="en-US" sz="2800" dirty="0"/>
-              <a:t>_</a:t>
-            </a:r>
-            <a:r>
-              <a:rPr lang="en-US" sz="2800" i="1" dirty="0"/>
-              <a:t>time_stamp</a:t>
+              <a:t> select_trace </a:t>
+            </a:r>
+            <a:r>
+              <a:rPr lang="en-US" sz="2800" dirty="0">
+                <a:solidFill>
+                  <a:schemeClr val="accent4"/>
+                </a:solidFill>
+              </a:rPr>
+              <a:t>import</a:t>
             </a:r>
             <a:r>
               <a:rPr lang="en-US" sz="2800" dirty="0"/>
-              <a:t>.</a:t>
-            </a:r>
-            <a:r>
-              <a:rPr lang="en-US" sz="2800" i="1" dirty="0"/>
-              <a:t>ext</a:t>
-            </a:r>
+              <a:t> SlTrace</a:t>
+            </a:r>
+          </a:p>
+          <a:p>
+            <a:pPr marL="457200" lvl="1" indent="0">
+              <a:buNone/>
+            </a:pPr>
             <a:r>
               <a:rPr lang="en-US" sz="2800" dirty="0"/>
-              <a:t>ension</a:t>
-            </a:r>
-          </a:p>
-          <a:p>
-            <a:pPr lvl="2"/>
-            <a:r>
-              <a:rPr lang="en-US" sz="2800" dirty="0"/>
-              <a:t> e.g. log/sudoku_20200116_170821.sllog</a:t>
-            </a:r>
-          </a:p>
-          <a:p>
+              <a:t>SlTrace.lg(</a:t>
+            </a:r>
+            <a:r>
+              <a:rPr lang="en-US" sz="2800" dirty="0">
+                <a:solidFill>
+                  <a:schemeClr val="accent2"/>
+                </a:solidFill>
+              </a:rPr>
+              <a:t>"Just the minimum for logging")</a:t>
+            </a:r>
+          </a:p>
+          <a:p>
+            <a:pPr marL="457200" lvl="1" indent="0">
+              <a:buNone/>
+            </a:pPr>
+            <a:r>
+              <a:rPr lang="en-US" sz="3100" dirty="0">
+                <a:solidFill>
+                  <a:srgbClr val="00B0F0"/>
+                </a:solidFill>
+              </a:rPr>
+              <a:t>From Logging File …</a:t>
+            </a:r>
+          </a:p>
+          <a:p>
+            <a:pPr marL="457200" lvl="1" indent="0">
+              <a:buNone/>
+            </a:pPr>
+            <a:r>
+              <a:rPr lang="en-US" sz="2200" dirty="0"/>
+              <a:t> 20200303_115746 Creating Log File Name: …\log\logging_absolute_minimum_20200303_115746.sllog</a:t>
+            </a:r>
+          </a:p>
+          <a:p>
+            <a:pPr marL="457200" lvl="1" indent="0">
+              <a:buNone/>
+            </a:pPr>
+            <a:r>
+              <a:rPr lang="en-US" sz="2200" dirty="0"/>
+              <a:t>…</a:t>
+            </a:r>
+          </a:p>
+          <a:p>
+            <a:pPr marL="457200" lvl="1" indent="0">
+              <a:buNone/>
+            </a:pPr>
+            <a:r>
+              <a:rPr lang="en-US" sz="2200" dirty="0"/>
+              <a:t> 20200303_115746 Just the minimum for logging</a:t>
+            </a:r>
+          </a:p>
+          <a:p>
+            <a:pPr marL="457200" lvl="1" indent="0">
+              <a:buNone/>
+            </a:pPr>
             <a:endParaRPr lang="en-US" sz="3600" dirty="0"/>
           </a:p>
         </p:txBody>
@@ -11306,7 +12019,7 @@
           <a:p>
             <a:fld id="{A7119916-CD40-456D-ABE3-55F8822671F7}" type="datetime1">
               <a:rPr lang="en-US" smtClean="0"/>
-              <a:t>2/29/2020</a:t>
+              <a:t>3/3/2020</a:t>
             </a:fld>
             <a:endParaRPr lang="en-US" dirty="0"/>
           </a:p>
@@ -11372,7 +12085,7 @@
     </p:spTree>
     <p:extLst>
       <p:ext uri="{BB962C8B-B14F-4D97-AF65-F5344CB8AC3E}">
-        <p14:creationId xmlns:p14="http://schemas.microsoft.com/office/powerpoint/2010/main" val="148222389"/>
+        <p14:creationId xmlns:p14="http://schemas.microsoft.com/office/powerpoint/2010/main" val="1737207891"/>
       </p:ext>
     </p:extLst>
   </p:cSld>
@@ -11415,38 +12128,61 @@
             <p:ph type="title"/>
           </p:nvPr>
         </p:nvSpPr>
-        <p:spPr/>
-        <p:txBody>
-          <a:bodyPr/>
+        <p:spPr>
+          <a:xfrm>
+            <a:off x="256479" y="609600"/>
+            <a:ext cx="9556594" cy="1320800"/>
+          </a:xfrm>
+        </p:spPr>
+        <p:txBody>
+          <a:bodyPr>
+            <a:normAutofit fontScale="90000"/>
+          </a:bodyPr>
           <a:lstStyle/>
           <a:p>
             <a:r>
               <a:rPr lang="en-US" dirty="0"/>
-              <a:t>Logging – Example</a:t>
-            </a:r>
-            <a:br>
-              <a:rPr lang="en-US" dirty="0"/>
-            </a:br>
-            <a:r>
-              <a:rPr lang="en-US" dirty="0"/>
-              <a:t> </a:t>
-            </a:r>
-            <a:r>
-              <a:rPr lang="en-US" dirty="0">
+              <a:t>SelectTrace class -  </a:t>
+            </a:r>
+            <a:r>
+              <a:rPr lang="en-US" sz="2200" dirty="0">
                 <a:solidFill>
                   <a:srgbClr val="00B0F0"/>
                 </a:solidFill>
               </a:rPr>
-              <a:t>- </a:t>
-            </a:r>
-            <a:r>
-              <a:rPr lang="en-US" sz="2800" dirty="0">
+              <a:t>(</a:t>
+            </a:r>
+            <a:r>
+              <a:rPr lang="en-US" sz="3100" dirty="0">
                 <a:solidFill>
                   <a:srgbClr val="00B0F0"/>
                 </a:solidFill>
               </a:rPr>
-              <a:t>GitHub raysmith619/resource_lib </a:t>
-            </a:r>
+              <a:t>GitHub raysmith619/resource_lib</a:t>
+            </a:r>
+            <a:r>
+              <a:rPr lang="en-US" sz="2200" dirty="0">
+                <a:solidFill>
+                  <a:srgbClr val="00B0F0"/>
+                </a:solidFill>
+              </a:rPr>
+              <a:t>)</a:t>
+            </a:r>
+            <a:br>
+              <a:rPr lang="en-US" sz="2200" dirty="0">
+                <a:solidFill>
+                  <a:srgbClr val="00B0F0"/>
+                </a:solidFill>
+              </a:rPr>
+            </a:br>
+            <a:r>
+              <a:rPr lang="en-US" dirty="0"/>
+              <a:t>Output/Display - Features</a:t>
+            </a:r>
+            <a:br>
+              <a:rPr lang="en-US" dirty="0"/>
+            </a:br>
+            <a:endParaRPr lang="en-US" sz="2800" dirty="0"/>
           </a:p>
         </p:txBody>
       </p:sp>
@@ -11466,63 +12202,53 @@
             <p:ph idx="1"/>
           </p:nvPr>
         </p:nvSpPr>
-        <p:spPr>
-          <a:xfrm>
-            <a:off x="677333" y="2160589"/>
-            <a:ext cx="8964207" cy="3880773"/>
-          </a:xfrm>
-        </p:spPr>
+        <p:spPr/>
         <p:txBody>
           <a:bodyPr>
             <a:normAutofit/>
           </a:bodyPr>
           <a:lstStyle/>
           <a:p>
-            <a:pPr marL="400050" lvl="1" indent="0">
-              <a:buNone/>
-            </a:pPr>
-            <a:r>
-              <a:rPr lang="en-US" sz="3400" dirty="0">
-                <a:latin typeface="Courier New" panose="02070309020205020404" pitchFamily="49" charset="0"/>
-                <a:cs typeface="Courier New" panose="02070309020205020404" pitchFamily="49" charset="0"/>
-              </a:rPr>
-              <a:t># logging_absolute_minimum.py</a:t>
-            </a:r>
-          </a:p>
-          <a:p>
-            <a:pPr marL="400050" lvl="1" indent="0">
-              <a:buNone/>
-            </a:pPr>
-            <a:r>
-              <a:rPr lang="en-US" sz="3400" dirty="0">
-                <a:latin typeface="Courier New" panose="02070309020205020404" pitchFamily="49" charset="0"/>
-                <a:cs typeface="Courier New" panose="02070309020205020404" pitchFamily="49" charset="0"/>
-              </a:rPr>
-              <a:t>from select_trace import SlTrace</a:t>
-            </a:r>
-          </a:p>
-          <a:p>
-            <a:pPr marL="400050" lvl="1" indent="0">
-              <a:buNone/>
-            </a:pPr>
-            <a:endParaRPr lang="en-US" sz="3400" dirty="0">
-              <a:latin typeface="Courier New" panose="02070309020205020404" pitchFamily="49" charset="0"/>
-              <a:cs typeface="Courier New" panose="02070309020205020404" pitchFamily="49" charset="0"/>
-            </a:endParaRPr>
-          </a:p>
-          <a:p>
-            <a:pPr marL="400050" lvl="1" indent="0">
-              <a:buNone/>
-            </a:pPr>
-            <a:r>
-              <a:rPr lang="en-US" sz="3400" dirty="0">
-                <a:latin typeface="Courier New" panose="02070309020205020404" pitchFamily="49" charset="0"/>
-                <a:cs typeface="Courier New" panose="02070309020205020404" pitchFamily="49" charset="0"/>
-              </a:rPr>
-              <a:t>SlTrace.lg("Just the minimum for logging")</a:t>
-            </a:r>
-          </a:p>
-          <a:p>
+            <a:pPr lvl="1"/>
+            <a:r>
+              <a:rPr lang="en-US" sz="2800" dirty="0"/>
+              <a:t>Dual output: log file + Screen (STDOUT)</a:t>
+            </a:r>
+          </a:p>
+          <a:p>
+            <a:pPr lvl="1"/>
+            <a:r>
+              <a:rPr lang="en-US" sz="2800" dirty="0"/>
+              <a:t>Time stamped output</a:t>
+            </a:r>
+          </a:p>
+          <a:p>
+            <a:pPr lvl="2"/>
+            <a:r>
+              <a:rPr lang="en-US" sz="2800" dirty="0"/>
+              <a:t>Timestamp is optional to Screen</a:t>
+            </a:r>
+          </a:p>
+          <a:p>
+            <a:pPr lvl="2"/>
+            <a:r>
+              <a:rPr lang="en-US" sz="2800" dirty="0"/>
+              <a:t>Timestamp Resolution is adjustable</a:t>
+            </a:r>
+          </a:p>
+          <a:p>
+            <a:pPr lvl="1"/>
+            <a:r>
+              <a:rPr lang="en-US" sz="2800" dirty="0"/>
+              <a:t>Selective tracing output (flag level)</a:t>
+            </a:r>
+          </a:p>
+          <a:p>
+            <a:pPr lvl="1"/>
+            <a:r>
+              <a:rPr lang="en-US" sz="2800" dirty="0"/>
+              <a:t>Levels persist between program runs</a:t>
+            </a:r>
             <a:endParaRPr lang="en-US" sz="3600" dirty="0"/>
           </a:p>
         </p:txBody>
@@ -11550,7 +12276,7 @@
           <a:p>
             <a:fld id="{A7119916-CD40-456D-ABE3-55F8822671F7}" type="datetime1">
               <a:rPr lang="en-US" smtClean="0"/>
-              <a:t>2/29/2020</a:t>
+              <a:t>3/3/2020</a:t>
             </a:fld>
             <a:endParaRPr lang="en-US" dirty="0"/>
           </a:p>
@@ -11616,7 +12342,7 @@
     </p:spTree>
     <p:extLst>
       <p:ext uri="{BB962C8B-B14F-4D97-AF65-F5344CB8AC3E}">
-        <p14:creationId xmlns:p14="http://schemas.microsoft.com/office/powerpoint/2010/main" val="912761631"/>
+        <p14:creationId xmlns:p14="http://schemas.microsoft.com/office/powerpoint/2010/main" val="408986560"/>
       </p:ext>
     </p:extLst>
   </p:cSld>
@@ -11661,12 +12387,21 @@
         </p:nvSpPr>
         <p:spPr/>
         <p:txBody>
-          <a:bodyPr/>
+          <a:bodyPr>
+            <a:normAutofit fontScale="90000"/>
+          </a:bodyPr>
           <a:lstStyle/>
           <a:p>
             <a:r>
               <a:rPr lang="en-US" dirty="0"/>
-              <a:t>Logging – Logfile contents</a:t>
+              <a:t>SelectTrace class</a:t>
+            </a:r>
+            <a:br>
+              <a:rPr lang="en-US" dirty="0"/>
+            </a:br>
+            <a:r>
+              <a:rPr lang="en-US" dirty="0"/>
+              <a:t>Logging File Features</a:t>
             </a:r>
             <a:br>
               <a:rPr lang="en-US" dirty="0"/>
@@ -11691,39 +12426,69 @@
             <p:ph idx="1"/>
           </p:nvPr>
         </p:nvSpPr>
-        <p:spPr>
-          <a:xfrm>
-            <a:off x="228601" y="2160589"/>
-            <a:ext cx="9897034" cy="3880773"/>
-          </a:xfrm>
-        </p:spPr>
+        <p:spPr/>
         <p:txBody>
           <a:bodyPr>
             <a:normAutofit/>
           </a:bodyPr>
           <a:lstStyle/>
           <a:p>
-            <a:pPr marL="400050" lvl="1" indent="0">
-              <a:buNone/>
-            </a:pPr>
-            <a:r>
-              <a:rPr lang="en-US" sz="2800" dirty="0">
-                <a:latin typeface="Courier New" panose="02070309020205020404" pitchFamily="49" charset="0"/>
-                <a:cs typeface="Courier New" panose="02070309020205020404" pitchFamily="49" charset="0"/>
-              </a:rPr>
-              <a:t> 20200223_111219 Creating Log File Name: C:\Users\raysm\workspace\python\resource_lib\log\logging_absolute_minimum_20200223_111219.sllog</a:t>
-            </a:r>
-          </a:p>
-          <a:p>
-            <a:pPr marL="400050" lvl="1" indent="0">
-              <a:buNone/>
-            </a:pPr>
-            <a:r>
-              <a:rPr lang="en-US" sz="2800" dirty="0">
-                <a:latin typeface="Courier New" panose="02070309020205020404" pitchFamily="49" charset="0"/>
-                <a:cs typeface="Courier New" panose="02070309020205020404" pitchFamily="49" charset="0"/>
-              </a:rPr>
-              <a:t> 20200223_111219 Just the minimum for logging</a:t>
+            <a:pPr lvl="1"/>
+            <a:r>
+              <a:rPr lang="en-US" sz="3200" dirty="0"/>
+              <a:t>Automatic Creation</a:t>
+            </a:r>
+          </a:p>
+          <a:p>
+            <a:pPr lvl="1"/>
+            <a:r>
+              <a:rPr lang="en-US" sz="3200" dirty="0"/>
+              <a:t>Automatic log file naming</a:t>
+            </a:r>
+          </a:p>
+          <a:p>
+            <a:pPr lvl="1"/>
+            <a:r>
+              <a:rPr lang="en-US" sz="3200" dirty="0"/>
+              <a:t>Time stamped log file name</a:t>
+            </a:r>
+          </a:p>
+          <a:p>
+            <a:pPr lvl="2"/>
+            <a:r>
+              <a:rPr lang="en-US" sz="2800" b="1" dirty="0"/>
+              <a:t>log/</a:t>
+            </a:r>
+            <a:r>
+              <a:rPr lang="en-US" sz="2800" i="1" dirty="0"/>
+              <a:t>pgm_base_name</a:t>
+            </a:r>
+            <a:r>
+              <a:rPr lang="en-US" sz="2800" dirty="0"/>
+              <a:t>_</a:t>
+            </a:r>
+            <a:r>
+              <a:rPr lang="en-US" sz="2800" i="1" dirty="0"/>
+              <a:t>time_stamp</a:t>
+            </a:r>
+            <a:r>
+              <a:rPr lang="en-US" sz="2800" dirty="0"/>
+              <a:t>.</a:t>
+            </a:r>
+            <a:r>
+              <a:rPr lang="en-US" sz="2800" i="1" dirty="0"/>
+              <a:t>ext</a:t>
+            </a:r>
+            <a:r>
+              <a:rPr lang="en-US" sz="2800" dirty="0"/>
+              <a:t>ension</a:t>
+            </a:r>
+          </a:p>
+          <a:p>
+            <a:pPr lvl="2"/>
+            <a:r>
+              <a:rPr lang="en-US" sz="2800" dirty="0"/>
+              <a:t> e.g. log/sudoku_20200116_170821.sllog</a:t>
             </a:r>
           </a:p>
           <a:p>
@@ -11754,7 +12519,7 @@
           <a:p>
             <a:fld id="{A7119916-CD40-456D-ABE3-55F8822671F7}" type="datetime1">
               <a:rPr lang="en-US" smtClean="0"/>
-              <a:t>2/29/2020</a:t>
+              <a:t>3/3/2020</a:t>
             </a:fld>
             <a:endParaRPr lang="en-US" dirty="0"/>
           </a:p>
@@ -11820,7 +12585,7 @@
     </p:spTree>
     <p:extLst>
       <p:ext uri="{BB962C8B-B14F-4D97-AF65-F5344CB8AC3E}">
-        <p14:creationId xmlns:p14="http://schemas.microsoft.com/office/powerpoint/2010/main" val="257724182"/>
+        <p14:creationId xmlns:p14="http://schemas.microsoft.com/office/powerpoint/2010/main" val="148222389"/>
       </p:ext>
     </p:extLst>
   </p:cSld>

</xml_diff>